<commit_message>
Time to commit suiside
</commit_message>
<xml_diff>
--- a/Introduction to docker.pptx
+++ b/Introduction to docker.pptx
@@ -8,31 +8,31 @@
     <p:notesMasterId r:id="rId28"/>
   </p:notesMasterIdLst>
   <p:sldIdLst>
-    <p:sldId id="256" r:id="rId2"/>
-    <p:sldId id="258" r:id="rId3"/>
-    <p:sldId id="257" r:id="rId4"/>
-    <p:sldId id="259" r:id="rId5"/>
-    <p:sldId id="260" r:id="rId6"/>
-    <p:sldId id="261" r:id="rId7"/>
-    <p:sldId id="267" r:id="rId8"/>
-    <p:sldId id="272" r:id="rId9"/>
-    <p:sldId id="263" r:id="rId10"/>
-    <p:sldId id="270" r:id="rId11"/>
-    <p:sldId id="268" r:id="rId12"/>
-    <p:sldId id="275" r:id="rId13"/>
-    <p:sldId id="271" r:id="rId14"/>
-    <p:sldId id="273" r:id="rId15"/>
-    <p:sldId id="264" r:id="rId16"/>
-    <p:sldId id="276" r:id="rId17"/>
-    <p:sldId id="277" r:id="rId18"/>
-    <p:sldId id="274" r:id="rId19"/>
-    <p:sldId id="278" r:id="rId20"/>
-    <p:sldId id="280" r:id="rId21"/>
-    <p:sldId id="284" r:id="rId22"/>
-    <p:sldId id="281" r:id="rId23"/>
-    <p:sldId id="286" r:id="rId24"/>
+    <p:sldId id="287" r:id="rId2"/>
+    <p:sldId id="256" r:id="rId3"/>
+    <p:sldId id="258" r:id="rId4"/>
+    <p:sldId id="257" r:id="rId5"/>
+    <p:sldId id="259" r:id="rId6"/>
+    <p:sldId id="260" r:id="rId7"/>
+    <p:sldId id="261" r:id="rId8"/>
+    <p:sldId id="267" r:id="rId9"/>
+    <p:sldId id="272" r:id="rId10"/>
+    <p:sldId id="263" r:id="rId11"/>
+    <p:sldId id="270" r:id="rId12"/>
+    <p:sldId id="268" r:id="rId13"/>
+    <p:sldId id="275" r:id="rId14"/>
+    <p:sldId id="271" r:id="rId15"/>
+    <p:sldId id="273" r:id="rId16"/>
+    <p:sldId id="264" r:id="rId17"/>
+    <p:sldId id="276" r:id="rId18"/>
+    <p:sldId id="277" r:id="rId19"/>
+    <p:sldId id="274" r:id="rId20"/>
+    <p:sldId id="278" r:id="rId21"/>
+    <p:sldId id="280" r:id="rId22"/>
+    <p:sldId id="284" r:id="rId23"/>
+    <p:sldId id="281" r:id="rId24"/>
     <p:sldId id="279" r:id="rId25"/>
-    <p:sldId id="283" r:id="rId26"/>
+    <p:sldId id="288" r:id="rId26"/>
     <p:sldId id="285" r:id="rId27"/>
   </p:sldIdLst>
   <p:sldSz cx="12192000" cy="6858000"/>
@@ -560,7 +560,7 @@
           <a:p>
             <a:fld id="{114D959B-C3A2-43FC-B265-17A436B61326}" type="slidenum">
               <a:rPr lang="zh-TW" altLang="en-US" smtClean="0"/>
-              <a:t>2</a:t>
+              <a:t>3</a:t>
             </a:fld>
             <a:endParaRPr lang="zh-TW" altLang="en-US"/>
           </a:p>
@@ -648,7 +648,7 @@
           <a:p>
             <a:fld id="{114D959B-C3A2-43FC-B265-17A436B61326}" type="slidenum">
               <a:rPr lang="zh-TW" altLang="en-US" smtClean="0"/>
-              <a:t>5</a:t>
+              <a:t>6</a:t>
             </a:fld>
             <a:endParaRPr lang="zh-TW" altLang="en-US"/>
           </a:p>
@@ -732,7 +732,7 @@
           <a:p>
             <a:fld id="{114D959B-C3A2-43FC-B265-17A436B61326}" type="slidenum">
               <a:rPr lang="zh-TW" altLang="en-US" smtClean="0"/>
-              <a:t>6</a:t>
+              <a:t>7</a:t>
             </a:fld>
             <a:endParaRPr lang="zh-TW" altLang="en-US"/>
           </a:p>
@@ -816,7 +816,7 @@
           <a:p>
             <a:fld id="{114D959B-C3A2-43FC-B265-17A436B61326}" type="slidenum">
               <a:rPr lang="zh-TW" altLang="en-US" smtClean="0"/>
-              <a:t>18</a:t>
+              <a:t>19</a:t>
             </a:fld>
             <a:endParaRPr lang="zh-TW" altLang="en-US"/>
           </a:p>
@@ -4534,10 +4534,140 @@
       </p:grpSpPr>
       <p:sp>
         <p:nvSpPr>
+          <p:cNvPr id="2" name="標題 1"/>
+          <p:cNvSpPr>
+            <a:spLocks noGrp="1"/>
+          </p:cNvSpPr>
+          <p:nvPr>
+            <p:ph type="title"/>
+          </p:nvPr>
+        </p:nvSpPr>
+        <p:spPr/>
+        <p:txBody>
+          <a:bodyPr/>
+          <a:lstStyle/>
+          <a:p>
+            <a:r>
+              <a:rPr lang="en-US" altLang="zh-TW" dirty="0" smtClean="0"/>
+              <a:t>Pre course setup</a:t>
+            </a:r>
+            <a:endParaRPr lang="zh-TW" altLang="en-US" dirty="0"/>
+          </a:p>
+        </p:txBody>
+      </p:sp>
+      <p:sp>
+        <p:nvSpPr>
+          <p:cNvPr id="3" name="內容版面配置區 2"/>
+          <p:cNvSpPr>
+            <a:spLocks noGrp="1"/>
+          </p:cNvSpPr>
+          <p:nvPr>
+            <p:ph idx="1"/>
+          </p:nvPr>
+        </p:nvSpPr>
+        <p:spPr/>
+        <p:txBody>
+          <a:bodyPr/>
+          <a:lstStyle/>
+          <a:p>
+            <a:r>
+              <a:rPr lang="en-US" altLang="zh-TW" dirty="0" smtClean="0"/>
+              <a:t>1. install </a:t>
+            </a:r>
+            <a:r>
+              <a:rPr lang="en-US" altLang="zh-TW" dirty="0" err="1" smtClean="0"/>
+              <a:t>OpenVPN</a:t>
+            </a:r>
+            <a:r>
+              <a:rPr lang="zh-TW" altLang="en-US" dirty="0" smtClean="0"/>
+              <a:t> </a:t>
+            </a:r>
+            <a:r>
+              <a:rPr lang="en-US" altLang="zh-TW" dirty="0" smtClean="0"/>
+              <a:t>: </a:t>
+            </a:r>
+            <a:r>
+              <a:rPr lang="en-US" altLang="zh-TW" dirty="0" smtClean="0">
+                <a:hlinkClick r:id="rId2"/>
+              </a:rPr>
+              <a:t>Link</a:t>
+            </a:r>
+            <a:endParaRPr lang="en-US" altLang="zh-TW" dirty="0" smtClean="0"/>
+          </a:p>
+          <a:p>
+            <a:r>
+              <a:rPr lang="en-US" altLang="zh-TW" dirty="0" smtClean="0"/>
+              <a:t>2. go to </a:t>
+            </a:r>
+            <a:r>
+              <a:rPr lang="en-US" altLang="zh-TW" dirty="0" smtClean="0">
+                <a:hlinkClick r:id="rId3"/>
+              </a:rPr>
+              <a:t>HERE</a:t>
+            </a:r>
+            <a:r>
+              <a:rPr lang="en-US" altLang="zh-TW" dirty="0" smtClean="0"/>
+              <a:t> to get </a:t>
+            </a:r>
+            <a:r>
+              <a:rPr lang="en-US" altLang="zh-TW" dirty="0" err="1" smtClean="0"/>
+              <a:t>OpenVPN</a:t>
+            </a:r>
+            <a:r>
+              <a:rPr lang="en-US" altLang="zh-TW" dirty="0" smtClean="0"/>
+              <a:t> </a:t>
+            </a:r>
+          </a:p>
+          <a:p>
+            <a:r>
+              <a:rPr lang="en-US" altLang="zh-TW" dirty="0" smtClean="0"/>
+              <a:t>3. load Configurable file and DONE!!!</a:t>
+            </a:r>
+          </a:p>
+          <a:p>
+            <a:r>
+              <a:rPr lang="en-US" altLang="zh-TW" dirty="0" smtClean="0"/>
+              <a:t>( login with GPU Server Account )</a:t>
+            </a:r>
+          </a:p>
+        </p:txBody>
+      </p:sp>
+    </p:spTree>
+    <p:extLst>
+      <p:ext uri="{BB962C8B-B14F-4D97-AF65-F5344CB8AC3E}">
+        <p14:creationId xmlns:p14="http://schemas.microsoft.com/office/powerpoint/2010/main" val="1508885003"/>
+      </p:ext>
+    </p:extLst>
+  </p:cSld>
+  <p:clrMapOvr>
+    <a:masterClrMapping/>
+  </p:clrMapOvr>
+</p:sld>
+</file>
+
+<file path=ppt/slides/slide10.xml><?xml version="1.0" encoding="utf-8"?>
+<p:sld xmlns:a="http://schemas.openxmlformats.org/drawingml/2006/main" xmlns:r="http://schemas.openxmlformats.org/officeDocument/2006/relationships" xmlns:p="http://schemas.openxmlformats.org/presentationml/2006/main">
+  <p:cSld>
+    <p:spTree>
+      <p:nvGrpSpPr>
+        <p:cNvPr id="1" name=""/>
+        <p:cNvGrpSpPr/>
+        <p:nvPr/>
+      </p:nvGrpSpPr>
+      <p:grpSpPr>
+        <a:xfrm>
+          <a:off x="0" y="0"/>
+          <a:ext cx="0" cy="0"/>
+          <a:chOff x="0" y="0"/>
+          <a:chExt cx="0" cy="0"/>
+        </a:xfrm>
+      </p:grpSpPr>
+      <p:sp>
+        <p:nvSpPr>
           <p:cNvPr id="2" name="標題 1">
             <a:extLst>
               <a:ext uri="{FF2B5EF4-FFF2-40B4-BE49-F238E27FC236}">
-                <a16:creationId xmlns:a16="http://schemas.microsoft.com/office/drawing/2014/main" id="{06BB4BF2-EE0F-45CE-B9D7-D8E7A1DC3341}"/>
+                <a16:creationId xmlns:a16="http://schemas.microsoft.com/office/drawing/2014/main" id="{B0777A18-CB58-4BE1-89AA-14684198CE0F}"/>
               </a:ext>
             </a:extLst>
           </p:cNvPr>
@@ -4545,7 +4675,7 @@
             <a:spLocks noGrp="1"/>
           </p:cNvSpPr>
           <p:nvPr>
-            <p:ph type="ctrTitle"/>
+            <p:ph type="title"/>
           </p:nvPr>
         </p:nvSpPr>
         <p:spPr/>
@@ -4554,12 +4684,19 @@
           <a:lstStyle/>
           <a:p>
             <a:r>
+              <a:rPr lang="en-US" altLang="zh-TW" dirty="0" err="1"/>
+              <a:t>DockerFile</a:t>
+            </a:r>
+            <a:r>
               <a:rPr lang="en-US" altLang="zh-TW" dirty="0"/>
-              <a:t>Introduction to </a:t>
-            </a:r>
-            <a:r>
-              <a:rPr lang="en-US" altLang="zh-TW" dirty="0" err="1" smtClean="0"/>
-              <a:t>docker</a:t>
+              <a:t/>
+            </a:r>
+            <a:br>
+              <a:rPr lang="en-US" altLang="zh-TW" dirty="0"/>
+            </a:br>
+            <a:r>
+              <a:rPr lang="en-US" altLang="zh-TW" sz="2800" dirty="0"/>
+              <a:t>Build your own image for scratch</a:t>
             </a:r>
             <a:endParaRPr lang="zh-TW" altLang="en-US" dirty="0"/>
           </a:p>
@@ -4567,10 +4704,10 @@
       </p:sp>
       <p:sp>
         <p:nvSpPr>
-          <p:cNvPr id="3" name="副標題 2">
+          <p:cNvPr id="3" name="內容版面配置區 2">
             <a:extLst>
               <a:ext uri="{FF2B5EF4-FFF2-40B4-BE49-F238E27FC236}">
-                <a16:creationId xmlns:a16="http://schemas.microsoft.com/office/drawing/2014/main" id="{E49EAB2F-22E4-4F83-B08C-59A358BD231B}"/>
+                <a16:creationId xmlns:a16="http://schemas.microsoft.com/office/drawing/2014/main" id="{25953EA7-626B-41E1-A872-F71A6CF4AAC2}"/>
               </a:ext>
             </a:extLst>
           </p:cNvPr>
@@ -4578,32 +4715,800 @@
             <a:spLocks noGrp="1"/>
           </p:cNvSpPr>
           <p:nvPr>
-            <p:ph type="subTitle" idx="1"/>
+            <p:ph idx="1"/>
           </p:nvPr>
         </p:nvSpPr>
-        <p:spPr/>
+        <p:spPr>
+          <a:xfrm>
+            <a:off x="6096000" y="1916756"/>
+            <a:ext cx="5365664" cy="4430778"/>
+          </a:xfrm>
+        </p:spPr>
         <p:txBody>
-          <a:bodyPr/>
+          <a:bodyPr>
+            <a:normAutofit lnSpcReduction="10000"/>
+          </a:bodyPr>
           <a:lstStyle/>
           <a:p>
             <a:r>
-              <a:rPr lang="en-US" altLang="zh-TW" dirty="0" smtClean="0"/>
-              <a:t>Credits to Meng, Shane</a:t>
-            </a:r>
-          </a:p>
-          <a:p>
-            <a:r>
-              <a:rPr lang="en-US" altLang="zh-TW" dirty="0" smtClean="0"/>
-              <a:t>By BT</a:t>
-            </a:r>
+              <a:rPr lang="en-US" altLang="zh-TW" dirty="0"/>
+              <a:t>INSTRUCTION</a:t>
+            </a:r>
+          </a:p>
+          <a:p>
+            <a:pPr lvl="1"/>
+            <a:r>
+              <a:rPr lang="en-US" altLang="zh-TW" dirty="0">
+                <a:hlinkClick r:id="rId2"/>
+              </a:rPr>
+              <a:t>COPY</a:t>
+            </a:r>
+            <a:r>
+              <a:rPr lang="en-US" altLang="zh-TW" dirty="0"/>
+              <a:t> : ( almost same as ADD ) but copy is preferred</a:t>
+            </a:r>
+            <a:r>
+              <a:rPr lang="en-US" altLang="zh-TW" baseline="30000" dirty="0"/>
+              <a:t>1</a:t>
+            </a:r>
+          </a:p>
+          <a:p>
+            <a:pPr lvl="2"/>
+            <a:r>
+              <a:rPr lang="en-US" altLang="zh-TW" sz="1600" dirty="0"/>
+              <a:t>COPY [--</a:t>
+            </a:r>
+            <a:r>
+              <a:rPr lang="en-US" altLang="zh-TW" sz="1600" dirty="0" err="1"/>
+              <a:t>chown</a:t>
+            </a:r>
+            <a:r>
+              <a:rPr lang="en-US" altLang="zh-TW" sz="1600" dirty="0"/>
+              <a:t>=&lt;user&gt;:&lt;group&gt;] &lt;</a:t>
+            </a:r>
+            <a:r>
+              <a:rPr lang="en-US" altLang="zh-TW" sz="1600" dirty="0" err="1"/>
+              <a:t>src</a:t>
+            </a:r>
+            <a:r>
+              <a:rPr lang="en-US" altLang="zh-TW" sz="1600" dirty="0"/>
+              <a:t>&gt;... &lt;</a:t>
+            </a:r>
+            <a:r>
+              <a:rPr lang="en-US" altLang="zh-TW" sz="1600" dirty="0" err="1"/>
+              <a:t>dest</a:t>
+            </a:r>
+            <a:r>
+              <a:rPr lang="en-US" altLang="zh-TW" sz="1600" dirty="0"/>
+              <a:t>&gt;</a:t>
+            </a:r>
+          </a:p>
+          <a:p>
+            <a:pPr lvl="2"/>
+            <a:r>
+              <a:rPr lang="en-US" altLang="zh-TW" dirty="0"/>
+              <a:t>*The directory itself is not copied, just its contents.</a:t>
+            </a:r>
+          </a:p>
+          <a:p>
+            <a:pPr lvl="1"/>
+            <a:r>
+              <a:rPr lang="en-US" altLang="zh-TW" dirty="0">
+                <a:hlinkClick r:id="rId3"/>
+              </a:rPr>
+              <a:t>EXPOSE</a:t>
+            </a:r>
+            <a:r>
+              <a:rPr lang="en-US" altLang="zh-TW" dirty="0"/>
+              <a:t> : specifies the port to listen on</a:t>
+            </a:r>
+          </a:p>
+          <a:p>
+            <a:pPr lvl="2"/>
+            <a:r>
+              <a:rPr lang="en-US" altLang="zh-TW" dirty="0"/>
+              <a:t>EXPOSE 80/</a:t>
+            </a:r>
+            <a:r>
+              <a:rPr lang="en-US" altLang="zh-TW" dirty="0" err="1"/>
+              <a:t>tcp</a:t>
+            </a:r>
+            <a:endParaRPr lang="en-US" altLang="zh-TW" dirty="0"/>
+          </a:p>
+          <a:p>
+            <a:pPr lvl="2"/>
+            <a:r>
+              <a:rPr lang="en-US" altLang="zh-TW" dirty="0"/>
+              <a:t>EXPOSE 80/</a:t>
+            </a:r>
+            <a:r>
+              <a:rPr lang="en-US" altLang="zh-TW" dirty="0" err="1"/>
+              <a:t>udp</a:t>
+            </a:r>
+            <a:endParaRPr lang="en-US" altLang="zh-TW" dirty="0"/>
+          </a:p>
+          <a:p>
+            <a:pPr lvl="1"/>
+            <a:r>
+              <a:rPr lang="en-US" altLang="zh-TW" dirty="0">
+                <a:hlinkClick r:id="rId4"/>
+              </a:rPr>
+              <a:t>CMD</a:t>
+            </a:r>
+            <a:r>
+              <a:rPr lang="en-US" altLang="zh-TW" dirty="0"/>
+              <a:t> : provide defaults for an executing container</a:t>
+            </a:r>
+          </a:p>
+          <a:p>
+            <a:pPr lvl="2"/>
+            <a:r>
+              <a:rPr lang="en-US" altLang="zh-TW" dirty="0"/>
+              <a:t>CMD ["executable","param1","param2"]</a:t>
+            </a:r>
+          </a:p>
+          <a:p>
+            <a:pPr lvl="1"/>
+            <a:r>
+              <a:rPr lang="en-US" altLang="zh-TW" dirty="0">
+                <a:hlinkClick r:id="rId5"/>
+              </a:rPr>
+              <a:t>ENTRYPOINT</a:t>
+            </a:r>
+            <a:r>
+              <a:rPr lang="en-US" altLang="zh-TW" dirty="0"/>
+              <a:t> : let a container run as an executable</a:t>
+            </a:r>
+          </a:p>
+          <a:p>
+            <a:pPr lvl="2"/>
+            <a:r>
+              <a:rPr lang="en-US" altLang="zh-TW" dirty="0"/>
+              <a:t>ENTRYPOINT ["executable", "param1", "param2"]</a:t>
+            </a:r>
+          </a:p>
+          <a:p>
+            <a:pPr lvl="2"/>
+            <a:r>
+              <a:rPr lang="en-US" altLang="zh-TW" dirty="0" err="1">
+                <a:hlinkClick r:id="rId6"/>
+              </a:rPr>
+              <a:t>cmd</a:t>
+            </a:r>
+            <a:r>
+              <a:rPr lang="en-US" altLang="zh-TW" dirty="0">
+                <a:hlinkClick r:id="rId6"/>
+              </a:rPr>
+              <a:t> &amp; </a:t>
+            </a:r>
+            <a:r>
+              <a:rPr lang="en-US" altLang="zh-TW" dirty="0" err="1">
+                <a:hlinkClick r:id="rId6"/>
+              </a:rPr>
+              <a:t>entrypoint</a:t>
+            </a:r>
+            <a:endParaRPr lang="en-US" altLang="zh-TW" dirty="0"/>
+          </a:p>
+          <a:p>
+            <a:pPr lvl="1"/>
+            <a:r>
+              <a:rPr lang="en-US" altLang="zh-TW" dirty="0">
+                <a:hlinkClick r:id="rId7"/>
+              </a:rPr>
+              <a:t>ENV</a:t>
+            </a:r>
+            <a:r>
+              <a:rPr lang="en-US" altLang="zh-TW" dirty="0"/>
+              <a:t> : environment </a:t>
+            </a:r>
+            <a:r>
+              <a:rPr lang="en-US" altLang="zh-TW" dirty="0" err="1"/>
+              <a:t>varables</a:t>
+            </a:r>
+            <a:endParaRPr lang="en-US" altLang="zh-TW" dirty="0"/>
+          </a:p>
+          <a:p>
+            <a:pPr lvl="1"/>
+            <a:r>
+              <a:rPr lang="en-US" altLang="zh-TW" dirty="0">
+                <a:hlinkClick r:id="rId8"/>
+              </a:rPr>
+              <a:t>VOLUME</a:t>
+            </a:r>
+            <a:r>
+              <a:rPr lang="en-US" altLang="zh-TW" dirty="0"/>
+              <a:t> :</a:t>
+            </a:r>
+            <a:r>
+              <a:rPr lang="zh-TW" altLang="en-US" dirty="0"/>
+              <a:t> </a:t>
+            </a:r>
+            <a:endParaRPr lang="en-US" altLang="zh-TW" dirty="0"/>
+          </a:p>
+          <a:p>
+            <a:pPr lvl="2"/>
+            <a:r>
+              <a:rPr lang="en-US" altLang="zh-TW" sz="1600" dirty="0"/>
+              <a:t>VOLUME ["/data"]</a:t>
+            </a:r>
+            <a:endParaRPr lang="en-US" altLang="zh-TW" dirty="0"/>
+          </a:p>
+          <a:p>
             <a:endParaRPr lang="zh-TW" altLang="en-US" dirty="0"/>
+          </a:p>
+        </p:txBody>
+      </p:sp>
+      <p:sp>
+        <p:nvSpPr>
+          <p:cNvPr id="4" name="矩形 3">
+            <a:extLst>
+              <a:ext uri="{FF2B5EF4-FFF2-40B4-BE49-F238E27FC236}">
+                <a16:creationId xmlns:a16="http://schemas.microsoft.com/office/drawing/2014/main" id="{A833EEEB-EBF5-423E-B91D-517CAB8569D4}"/>
+              </a:ext>
+            </a:extLst>
+          </p:cNvPr>
+          <p:cNvSpPr/>
+          <p:nvPr/>
+        </p:nvSpPr>
+        <p:spPr>
+          <a:xfrm>
+            <a:off x="1097280" y="1922970"/>
+            <a:ext cx="6096000" cy="4725396"/>
+          </a:xfrm>
+          <a:prstGeom prst="rect">
+            <a:avLst/>
+          </a:prstGeom>
+        </p:spPr>
+        <p:txBody>
+          <a:bodyPr vert="horz" lIns="0" tIns="45720" rIns="0" bIns="45720" rtlCol="0">
+            <a:normAutofit/>
+          </a:bodyPr>
+          <a:lstStyle/>
+          <a:p>
+            <a:pPr marL="91440" indent="-91440" defTabSz="914400">
+              <a:lnSpc>
+                <a:spcPct val="90000"/>
+              </a:lnSpc>
+              <a:spcBef>
+                <a:spcPts val="1200"/>
+              </a:spcBef>
+              <a:spcAft>
+                <a:spcPts val="200"/>
+              </a:spcAft>
+              <a:buClr>
+                <a:schemeClr val="accent1"/>
+              </a:buClr>
+              <a:buSzPct val="100000"/>
+              <a:buFont typeface="Calibri" panose="020F0502020204030204" pitchFamily="34" charset="0"/>
+              <a:buChar char=" "/>
+            </a:pPr>
+            <a:r>
+              <a:rPr lang="en-US" altLang="zh-TW" sz="2000" dirty="0">
+                <a:solidFill>
+                  <a:schemeClr val="tx1">
+                    <a:lumMod val="75000"/>
+                    <a:lumOff val="25000"/>
+                  </a:schemeClr>
+                </a:solidFill>
+              </a:rPr>
+              <a:t>INSTRUCTION</a:t>
+            </a:r>
+          </a:p>
+          <a:p>
+            <a:pPr marL="384048" lvl="1" indent="-182880" defTabSz="914400">
+              <a:lnSpc>
+                <a:spcPct val="90000"/>
+              </a:lnSpc>
+              <a:spcBef>
+                <a:spcPts val="200"/>
+              </a:spcBef>
+              <a:spcAft>
+                <a:spcPts val="400"/>
+              </a:spcAft>
+              <a:buClr>
+                <a:schemeClr val="accent1"/>
+              </a:buClr>
+              <a:buFont typeface="Calibri" pitchFamily="34" charset="0"/>
+              <a:buChar char="◦"/>
+            </a:pPr>
+            <a:r>
+              <a:rPr lang="en-US" altLang="zh-TW" dirty="0">
+                <a:solidFill>
+                  <a:schemeClr val="tx1">
+                    <a:lumMod val="75000"/>
+                    <a:lumOff val="25000"/>
+                  </a:schemeClr>
+                </a:solidFill>
+                <a:hlinkClick r:id="rId9"/>
+              </a:rPr>
+              <a:t>FROM</a:t>
+            </a:r>
+            <a:r>
+              <a:rPr lang="en-US" altLang="zh-TW" dirty="0">
+                <a:solidFill>
+                  <a:schemeClr val="tx1">
+                    <a:lumMod val="75000"/>
+                    <a:lumOff val="25000"/>
+                  </a:schemeClr>
+                </a:solidFill>
+              </a:rPr>
+              <a:t> :The base of the image</a:t>
+            </a:r>
+          </a:p>
+          <a:p>
+            <a:pPr marL="566928" lvl="2" indent="-182880" defTabSz="914400">
+              <a:lnSpc>
+                <a:spcPct val="90000"/>
+              </a:lnSpc>
+              <a:spcBef>
+                <a:spcPts val="200"/>
+              </a:spcBef>
+              <a:spcAft>
+                <a:spcPts val="400"/>
+              </a:spcAft>
+              <a:buClr>
+                <a:schemeClr val="accent1"/>
+              </a:buClr>
+              <a:buFont typeface="Calibri" pitchFamily="34" charset="0"/>
+              <a:buChar char="◦"/>
+            </a:pPr>
+            <a:r>
+              <a:rPr lang="en-US" altLang="zh-TW" sz="1600" dirty="0">
+                <a:solidFill>
+                  <a:schemeClr val="tx1">
+                    <a:lumMod val="75000"/>
+                    <a:lumOff val="25000"/>
+                  </a:schemeClr>
+                </a:solidFill>
+              </a:rPr>
+              <a:t>FROM &lt;image&gt;[:&lt;tag&gt;] [AS &lt;name&gt;]</a:t>
+            </a:r>
+          </a:p>
+          <a:p>
+            <a:pPr marL="384048" lvl="1" indent="-182880" defTabSz="914400">
+              <a:lnSpc>
+                <a:spcPct val="90000"/>
+              </a:lnSpc>
+              <a:spcBef>
+                <a:spcPts val="200"/>
+              </a:spcBef>
+              <a:spcAft>
+                <a:spcPts val="400"/>
+              </a:spcAft>
+              <a:buClr>
+                <a:schemeClr val="accent1"/>
+              </a:buClr>
+              <a:buFont typeface="Calibri" pitchFamily="34" charset="0"/>
+              <a:buChar char="◦"/>
+            </a:pPr>
+            <a:r>
+              <a:rPr lang="en-US" altLang="zh-TW" dirty="0">
+                <a:solidFill>
+                  <a:schemeClr val="tx1">
+                    <a:lumMod val="75000"/>
+                    <a:lumOff val="25000"/>
+                  </a:schemeClr>
+                </a:solidFill>
+                <a:hlinkClick r:id="rId10"/>
+              </a:rPr>
+              <a:t>WORKDIR</a:t>
+            </a:r>
+            <a:r>
+              <a:rPr lang="zh-TW" altLang="en-US" dirty="0">
+                <a:solidFill>
+                  <a:schemeClr val="tx1">
+                    <a:lumMod val="75000"/>
+                    <a:lumOff val="25000"/>
+                  </a:schemeClr>
+                </a:solidFill>
+              </a:rPr>
+              <a:t> </a:t>
+            </a:r>
+            <a:r>
+              <a:rPr lang="en-US" altLang="zh-TW" dirty="0">
+                <a:solidFill>
+                  <a:schemeClr val="tx1">
+                    <a:lumMod val="75000"/>
+                    <a:lumOff val="25000"/>
+                  </a:schemeClr>
+                </a:solidFill>
+              </a:rPr>
+              <a:t>:</a:t>
+            </a:r>
+            <a:r>
+              <a:rPr lang="zh-TW" altLang="en-US" dirty="0">
+                <a:solidFill>
+                  <a:schemeClr val="tx1">
+                    <a:lumMod val="75000"/>
+                    <a:lumOff val="25000"/>
+                  </a:schemeClr>
+                </a:solidFill>
+              </a:rPr>
+              <a:t> </a:t>
+            </a:r>
+            <a:endParaRPr lang="en-US" altLang="zh-TW" dirty="0">
+              <a:solidFill>
+                <a:schemeClr val="tx1">
+                  <a:lumMod val="75000"/>
+                  <a:lumOff val="25000"/>
+                </a:schemeClr>
+              </a:solidFill>
+            </a:endParaRPr>
+          </a:p>
+          <a:p>
+            <a:pPr marL="566928" lvl="2" indent="-182880" defTabSz="914400">
+              <a:lnSpc>
+                <a:spcPct val="90000"/>
+              </a:lnSpc>
+              <a:spcBef>
+                <a:spcPts val="200"/>
+              </a:spcBef>
+              <a:spcAft>
+                <a:spcPts val="400"/>
+              </a:spcAft>
+              <a:buClr>
+                <a:schemeClr val="accent1"/>
+              </a:buClr>
+              <a:buFont typeface="Calibri" pitchFamily="34" charset="0"/>
+              <a:buChar char="◦"/>
+            </a:pPr>
+            <a:r>
+              <a:rPr lang="en-US" altLang="zh-TW" sz="1600" dirty="0">
+                <a:solidFill>
+                  <a:schemeClr val="tx1">
+                    <a:lumMod val="75000"/>
+                    <a:lumOff val="25000"/>
+                  </a:schemeClr>
+                </a:solidFill>
+              </a:rPr>
+              <a:t>WORKDIR /path/to/</a:t>
+            </a:r>
+            <a:r>
+              <a:rPr lang="en-US" altLang="zh-TW" sz="1600" dirty="0" err="1">
+                <a:solidFill>
+                  <a:schemeClr val="tx1">
+                    <a:lumMod val="75000"/>
+                    <a:lumOff val="25000"/>
+                  </a:schemeClr>
+                </a:solidFill>
+              </a:rPr>
+              <a:t>workdir</a:t>
+            </a:r>
+            <a:endParaRPr lang="en-US" altLang="zh-TW" sz="1600" dirty="0">
+              <a:solidFill>
+                <a:schemeClr val="tx1">
+                  <a:lumMod val="75000"/>
+                  <a:lumOff val="25000"/>
+                </a:schemeClr>
+              </a:solidFill>
+            </a:endParaRPr>
+          </a:p>
+          <a:p>
+            <a:pPr marL="384048" lvl="1" indent="-182880" defTabSz="914400">
+              <a:lnSpc>
+                <a:spcPct val="90000"/>
+              </a:lnSpc>
+              <a:spcBef>
+                <a:spcPts val="200"/>
+              </a:spcBef>
+              <a:spcAft>
+                <a:spcPts val="400"/>
+              </a:spcAft>
+              <a:buClr>
+                <a:schemeClr val="accent1"/>
+              </a:buClr>
+              <a:buFont typeface="Calibri" pitchFamily="34" charset="0"/>
+              <a:buChar char="◦"/>
+            </a:pPr>
+            <a:r>
+              <a:rPr lang="en-US" altLang="zh-TW" dirty="0">
+                <a:solidFill>
+                  <a:schemeClr val="tx1">
+                    <a:lumMod val="75000"/>
+                    <a:lumOff val="25000"/>
+                  </a:schemeClr>
+                </a:solidFill>
+                <a:hlinkClick r:id="rId11"/>
+              </a:rPr>
+              <a:t>USER</a:t>
+            </a:r>
+            <a:r>
+              <a:rPr lang="zh-TW" altLang="en-US" dirty="0">
+                <a:solidFill>
+                  <a:schemeClr val="tx1">
+                    <a:lumMod val="75000"/>
+                    <a:lumOff val="25000"/>
+                  </a:schemeClr>
+                </a:solidFill>
+              </a:rPr>
+              <a:t> </a:t>
+            </a:r>
+            <a:r>
+              <a:rPr lang="en-US" altLang="zh-TW" dirty="0">
+                <a:solidFill>
+                  <a:schemeClr val="tx1">
+                    <a:lumMod val="75000"/>
+                    <a:lumOff val="25000"/>
+                  </a:schemeClr>
+                </a:solidFill>
+              </a:rPr>
+              <a:t>:</a:t>
+            </a:r>
+            <a:r>
+              <a:rPr lang="zh-TW" altLang="en-US" dirty="0">
+                <a:solidFill>
+                  <a:schemeClr val="tx1">
+                    <a:lumMod val="75000"/>
+                    <a:lumOff val="25000"/>
+                  </a:schemeClr>
+                </a:solidFill>
+              </a:rPr>
+              <a:t> </a:t>
+            </a:r>
+            <a:endParaRPr lang="en-US" altLang="zh-TW" dirty="0">
+              <a:solidFill>
+                <a:schemeClr val="tx1">
+                  <a:lumMod val="75000"/>
+                  <a:lumOff val="25000"/>
+                </a:schemeClr>
+              </a:solidFill>
+            </a:endParaRPr>
+          </a:p>
+          <a:p>
+            <a:pPr marL="566928" lvl="2" indent="-182880" defTabSz="914400">
+              <a:lnSpc>
+                <a:spcPct val="90000"/>
+              </a:lnSpc>
+              <a:spcBef>
+                <a:spcPts val="200"/>
+              </a:spcBef>
+              <a:spcAft>
+                <a:spcPts val="400"/>
+              </a:spcAft>
+              <a:buClr>
+                <a:schemeClr val="accent1"/>
+              </a:buClr>
+              <a:buFont typeface="Calibri" pitchFamily="34" charset="0"/>
+              <a:buChar char="◦"/>
+            </a:pPr>
+            <a:r>
+              <a:rPr lang="en-US" altLang="zh-TW" sz="1600" dirty="0">
+                <a:solidFill>
+                  <a:schemeClr val="tx1">
+                    <a:lumMod val="75000"/>
+                    <a:lumOff val="25000"/>
+                  </a:schemeClr>
+                </a:solidFill>
+              </a:rPr>
+              <a:t>USER &lt;user&gt;[:&lt;group&gt;]</a:t>
+            </a:r>
+          </a:p>
+          <a:p>
+            <a:pPr marL="566928" lvl="2" indent="-182880" defTabSz="914400">
+              <a:lnSpc>
+                <a:spcPct val="90000"/>
+              </a:lnSpc>
+              <a:spcBef>
+                <a:spcPts val="200"/>
+              </a:spcBef>
+              <a:spcAft>
+                <a:spcPts val="400"/>
+              </a:spcAft>
+              <a:buClr>
+                <a:schemeClr val="accent1"/>
+              </a:buClr>
+              <a:buFont typeface="Calibri" pitchFamily="34" charset="0"/>
+              <a:buChar char="◦"/>
+            </a:pPr>
+            <a:r>
+              <a:rPr lang="en-US" altLang="zh-TW" sz="1600" dirty="0">
+                <a:solidFill>
+                  <a:schemeClr val="tx1">
+                    <a:lumMod val="75000"/>
+                    <a:lumOff val="25000"/>
+                  </a:schemeClr>
+                </a:solidFill>
+              </a:rPr>
+              <a:t>USER &lt;UID&gt;[:&lt;GID&gt;]</a:t>
+            </a:r>
+          </a:p>
+          <a:p>
+            <a:pPr marL="384048" lvl="1" indent="-182880" defTabSz="914400">
+              <a:lnSpc>
+                <a:spcPct val="90000"/>
+              </a:lnSpc>
+              <a:spcBef>
+                <a:spcPts val="200"/>
+              </a:spcBef>
+              <a:spcAft>
+                <a:spcPts val="400"/>
+              </a:spcAft>
+              <a:buClr>
+                <a:schemeClr val="accent1"/>
+              </a:buClr>
+              <a:buFont typeface="Calibri" pitchFamily="34" charset="0"/>
+              <a:buChar char="◦"/>
+            </a:pPr>
+            <a:r>
+              <a:rPr lang="en-US" altLang="zh-TW" dirty="0">
+                <a:solidFill>
+                  <a:schemeClr val="tx1">
+                    <a:lumMod val="75000"/>
+                    <a:lumOff val="25000"/>
+                  </a:schemeClr>
+                </a:solidFill>
+                <a:hlinkClick r:id="rId12"/>
+              </a:rPr>
+              <a:t>LABEL</a:t>
+            </a:r>
+            <a:r>
+              <a:rPr lang="en-US" altLang="zh-TW" dirty="0">
+                <a:solidFill>
+                  <a:schemeClr val="tx1">
+                    <a:lumMod val="75000"/>
+                    <a:lumOff val="25000"/>
+                  </a:schemeClr>
+                </a:solidFill>
+              </a:rPr>
+              <a:t> : metadata for image</a:t>
+            </a:r>
+          </a:p>
+          <a:p>
+            <a:pPr marL="384048" lvl="1" indent="-182880" defTabSz="914400">
+              <a:lnSpc>
+                <a:spcPct val="90000"/>
+              </a:lnSpc>
+              <a:spcBef>
+                <a:spcPts val="200"/>
+              </a:spcBef>
+              <a:spcAft>
+                <a:spcPts val="400"/>
+              </a:spcAft>
+              <a:buClr>
+                <a:schemeClr val="accent1"/>
+              </a:buClr>
+              <a:buFont typeface="Calibri" pitchFamily="34" charset="0"/>
+              <a:buChar char="◦"/>
+            </a:pPr>
+            <a:r>
+              <a:rPr lang="en-US" altLang="zh-TW" dirty="0">
+                <a:solidFill>
+                  <a:schemeClr val="tx1">
+                    <a:lumMod val="75000"/>
+                    <a:lumOff val="25000"/>
+                  </a:schemeClr>
+                </a:solidFill>
+                <a:hlinkClick r:id="rId13"/>
+              </a:rPr>
+              <a:t>RUN</a:t>
+            </a:r>
+            <a:r>
+              <a:rPr lang="en-US" altLang="zh-TW" dirty="0">
+                <a:solidFill>
+                  <a:schemeClr val="tx1">
+                    <a:lumMod val="75000"/>
+                    <a:lumOff val="25000"/>
+                  </a:schemeClr>
+                </a:solidFill>
+              </a:rPr>
+              <a:t> : execute a command</a:t>
+            </a:r>
+          </a:p>
+          <a:p>
+            <a:pPr marL="566928" lvl="2" indent="-182880" defTabSz="914400">
+              <a:lnSpc>
+                <a:spcPct val="90000"/>
+              </a:lnSpc>
+              <a:spcBef>
+                <a:spcPts val="200"/>
+              </a:spcBef>
+              <a:spcAft>
+                <a:spcPts val="400"/>
+              </a:spcAft>
+              <a:buClr>
+                <a:schemeClr val="accent1"/>
+              </a:buClr>
+              <a:buFont typeface="Calibri" pitchFamily="34" charset="0"/>
+              <a:buChar char="◦"/>
+            </a:pPr>
+            <a:r>
+              <a:rPr lang="en-US" altLang="zh-TW" sz="1600" dirty="0">
+                <a:solidFill>
+                  <a:schemeClr val="tx1">
+                    <a:lumMod val="75000"/>
+                    <a:lumOff val="25000"/>
+                  </a:schemeClr>
+                </a:solidFill>
+              </a:rPr>
+              <a:t>RUN &lt;command&gt;</a:t>
+            </a:r>
+          </a:p>
+          <a:p>
+            <a:pPr marL="566928" lvl="2" indent="-182880" defTabSz="914400">
+              <a:lnSpc>
+                <a:spcPct val="90000"/>
+              </a:lnSpc>
+              <a:spcBef>
+                <a:spcPts val="200"/>
+              </a:spcBef>
+              <a:spcAft>
+                <a:spcPts val="400"/>
+              </a:spcAft>
+              <a:buClr>
+                <a:schemeClr val="accent1"/>
+              </a:buClr>
+              <a:buFont typeface="Calibri" pitchFamily="34" charset="0"/>
+              <a:buChar char="◦"/>
+            </a:pPr>
+            <a:r>
+              <a:rPr lang="en-US" altLang="zh-TW" sz="1600" dirty="0">
+                <a:solidFill>
+                  <a:schemeClr val="tx1">
+                    <a:lumMod val="75000"/>
+                    <a:lumOff val="25000"/>
+                  </a:schemeClr>
+                </a:solidFill>
+              </a:rPr>
+              <a:t>RUN ["executable", "param1", "param2"]</a:t>
+            </a:r>
+          </a:p>
+          <a:p>
+            <a:pPr marL="566928" lvl="2" indent="-182880" defTabSz="914400">
+              <a:lnSpc>
+                <a:spcPct val="90000"/>
+              </a:lnSpc>
+              <a:spcBef>
+                <a:spcPts val="200"/>
+              </a:spcBef>
+              <a:spcAft>
+                <a:spcPts val="400"/>
+              </a:spcAft>
+              <a:buClr>
+                <a:schemeClr val="accent1"/>
+              </a:buClr>
+              <a:buFont typeface="Calibri" pitchFamily="34" charset="0"/>
+              <a:buChar char="◦"/>
+            </a:pPr>
+            <a:r>
+              <a:rPr lang="en-US" altLang="zh-TW" sz="1600" dirty="0">
+                <a:solidFill>
+                  <a:schemeClr val="tx1">
+                    <a:lumMod val="75000"/>
+                    <a:lumOff val="25000"/>
+                  </a:schemeClr>
+                </a:solidFill>
+              </a:rPr>
+              <a:t>RUN [ "</a:t>
+            </a:r>
+            <a:r>
+              <a:rPr lang="en-US" altLang="zh-TW" sz="1600" dirty="0" err="1">
+                <a:solidFill>
+                  <a:schemeClr val="tx1">
+                    <a:lumMod val="75000"/>
+                    <a:lumOff val="25000"/>
+                  </a:schemeClr>
+                </a:solidFill>
+              </a:rPr>
+              <a:t>sh</a:t>
+            </a:r>
+            <a:r>
+              <a:rPr lang="en-US" altLang="zh-TW" sz="1600" dirty="0">
+                <a:solidFill>
+                  <a:schemeClr val="tx1">
+                    <a:lumMod val="75000"/>
+                    <a:lumOff val="25000"/>
+                  </a:schemeClr>
+                </a:solidFill>
+              </a:rPr>
+              <a:t>", "-c", "echo $HOME" ]</a:t>
+            </a:r>
           </a:p>
         </p:txBody>
       </p:sp>
     </p:spTree>
     <p:extLst>
       <p:ext uri="{BB962C8B-B14F-4D97-AF65-F5344CB8AC3E}">
-        <p14:creationId xmlns:p14="http://schemas.microsoft.com/office/powerpoint/2010/main" val="2232824169"/>
+        <p14:creationId xmlns:p14="http://schemas.microsoft.com/office/powerpoint/2010/main" val="3884591709"/>
       </p:ext>
     </p:extLst>
   </p:cSld>
@@ -4620,7 +5525,7 @@
 </p:sld>
 </file>
 
-<file path=ppt/slides/slide10.xml><?xml version="1.0" encoding="utf-8"?>
+<file path=ppt/slides/slide11.xml><?xml version="1.0" encoding="utf-8"?>
 <p:sld xmlns:a="http://schemas.openxmlformats.org/drawingml/2006/main" xmlns:r="http://schemas.openxmlformats.org/officeDocument/2006/relationships" xmlns:p="http://schemas.openxmlformats.org/presentationml/2006/main">
   <p:cSld>
     <p:spTree>
@@ -5080,7 +5985,7 @@
 </p:sld>
 </file>
 
-<file path=ppt/slides/slide11.xml><?xml version="1.0" encoding="utf-8"?>
+<file path=ppt/slides/slide12.xml><?xml version="1.0" encoding="utf-8"?>
 <p:sld xmlns:a="http://schemas.openxmlformats.org/drawingml/2006/main" xmlns:r="http://schemas.openxmlformats.org/officeDocument/2006/relationships" xmlns:p="http://schemas.openxmlformats.org/presentationml/2006/main">
   <p:cSld>
     <p:bg>
@@ -5293,7 +6198,7 @@
 </p:sld>
 </file>
 
-<file path=ppt/slides/slide12.xml><?xml version="1.0" encoding="utf-8"?>
+<file path=ppt/slides/slide13.xml><?xml version="1.0" encoding="utf-8"?>
 <p:sld xmlns:a="http://schemas.openxmlformats.org/drawingml/2006/main" xmlns:r="http://schemas.openxmlformats.org/officeDocument/2006/relationships" xmlns:p="http://schemas.openxmlformats.org/presentationml/2006/main">
   <p:cSld>
     <p:spTree>
@@ -5463,7 +6368,7 @@
 </p:sld>
 </file>
 
-<file path=ppt/slides/slide13.xml><?xml version="1.0" encoding="utf-8"?>
+<file path=ppt/slides/slide14.xml><?xml version="1.0" encoding="utf-8"?>
 <p:sld xmlns:a="http://schemas.openxmlformats.org/drawingml/2006/main" xmlns:r="http://schemas.openxmlformats.org/officeDocument/2006/relationships" xmlns:p="http://schemas.openxmlformats.org/presentationml/2006/main">
   <p:cSld>
     <p:spTree>
@@ -5791,7 +6696,7 @@
 </p:sld>
 </file>
 
-<file path=ppt/slides/slide14.xml><?xml version="1.0" encoding="utf-8"?>
+<file path=ppt/slides/slide15.xml><?xml version="1.0" encoding="utf-8"?>
 <p:sld xmlns:a="http://schemas.openxmlformats.org/drawingml/2006/main" xmlns:r="http://schemas.openxmlformats.org/officeDocument/2006/relationships" xmlns:p="http://schemas.openxmlformats.org/presentationml/2006/main">
   <p:cSld>
     <p:spTree>
@@ -5912,7 +6817,7 @@
 </p:sld>
 </file>
 
-<file path=ppt/slides/slide15.xml><?xml version="1.0" encoding="utf-8"?>
+<file path=ppt/slides/slide16.xml><?xml version="1.0" encoding="utf-8"?>
 <p:sld xmlns:a="http://schemas.openxmlformats.org/drawingml/2006/main" xmlns:r="http://schemas.openxmlformats.org/officeDocument/2006/relationships" xmlns:p="http://schemas.openxmlformats.org/presentationml/2006/main">
   <p:cSld>
     <p:spTree>
@@ -6084,7 +6989,7 @@
 </p:sld>
 </file>
 
-<file path=ppt/slides/slide16.xml><?xml version="1.0" encoding="utf-8"?>
+<file path=ppt/slides/slide17.xml><?xml version="1.0" encoding="utf-8"?>
 <p:sld xmlns:a="http://schemas.openxmlformats.org/drawingml/2006/main" xmlns:r="http://schemas.openxmlformats.org/officeDocument/2006/relationships" xmlns:p="http://schemas.openxmlformats.org/presentationml/2006/main">
   <p:cSld>
     <p:spTree>
@@ -6199,7 +7104,7 @@
 </p:sld>
 </file>
 
-<file path=ppt/slides/slide17.xml><?xml version="1.0" encoding="utf-8"?>
+<file path=ppt/slides/slide18.xml><?xml version="1.0" encoding="utf-8"?>
 <p:sld xmlns:a="http://schemas.openxmlformats.org/drawingml/2006/main" xmlns:r="http://schemas.openxmlformats.org/officeDocument/2006/relationships" xmlns:p="http://schemas.openxmlformats.org/presentationml/2006/main">
   <p:cSld>
     <p:spTree>
@@ -6300,7 +7205,7 @@
 </p:sld>
 </file>
 
-<file path=ppt/slides/slide18.xml><?xml version="1.0" encoding="utf-8"?>
+<file path=ppt/slides/slide19.xml><?xml version="1.0" encoding="utf-8"?>
 <p:sld xmlns:a="http://schemas.openxmlformats.org/drawingml/2006/main" xmlns:r="http://schemas.openxmlformats.org/officeDocument/2006/relationships" xmlns:p="http://schemas.openxmlformats.org/presentationml/2006/main">
   <p:cSld>
     <p:spTree>
@@ -6406,7 +7311,112 @@
 </p:sld>
 </file>
 
-<file path=ppt/slides/slide19.xml><?xml version="1.0" encoding="utf-8"?>
+<file path=ppt/slides/slide2.xml><?xml version="1.0" encoding="utf-8"?>
+<p:sld xmlns:a="http://schemas.openxmlformats.org/drawingml/2006/main" xmlns:r="http://schemas.openxmlformats.org/officeDocument/2006/relationships" xmlns:p="http://schemas.openxmlformats.org/presentationml/2006/main">
+  <p:cSld>
+    <p:spTree>
+      <p:nvGrpSpPr>
+        <p:cNvPr id="1" name=""/>
+        <p:cNvGrpSpPr/>
+        <p:nvPr/>
+      </p:nvGrpSpPr>
+      <p:grpSpPr>
+        <a:xfrm>
+          <a:off x="0" y="0"/>
+          <a:ext cx="0" cy="0"/>
+          <a:chOff x="0" y="0"/>
+          <a:chExt cx="0" cy="0"/>
+        </a:xfrm>
+      </p:grpSpPr>
+      <p:sp>
+        <p:nvSpPr>
+          <p:cNvPr id="2" name="標題 1">
+            <a:extLst>
+              <a:ext uri="{FF2B5EF4-FFF2-40B4-BE49-F238E27FC236}">
+                <a16:creationId xmlns:a16="http://schemas.microsoft.com/office/drawing/2014/main" id="{06BB4BF2-EE0F-45CE-B9D7-D8E7A1DC3341}"/>
+              </a:ext>
+            </a:extLst>
+          </p:cNvPr>
+          <p:cNvSpPr>
+            <a:spLocks noGrp="1"/>
+          </p:cNvSpPr>
+          <p:nvPr>
+            <p:ph type="ctrTitle"/>
+          </p:nvPr>
+        </p:nvSpPr>
+        <p:spPr/>
+        <p:txBody>
+          <a:bodyPr/>
+          <a:lstStyle/>
+          <a:p>
+            <a:r>
+              <a:rPr lang="en-US" altLang="zh-TW" dirty="0"/>
+              <a:t>Introduction to </a:t>
+            </a:r>
+            <a:r>
+              <a:rPr lang="en-US" altLang="zh-TW" dirty="0" err="1" smtClean="0"/>
+              <a:t>docker</a:t>
+            </a:r>
+            <a:endParaRPr lang="zh-TW" altLang="en-US" dirty="0"/>
+          </a:p>
+        </p:txBody>
+      </p:sp>
+      <p:sp>
+        <p:nvSpPr>
+          <p:cNvPr id="3" name="副標題 2">
+            <a:extLst>
+              <a:ext uri="{FF2B5EF4-FFF2-40B4-BE49-F238E27FC236}">
+                <a16:creationId xmlns:a16="http://schemas.microsoft.com/office/drawing/2014/main" id="{E49EAB2F-22E4-4F83-B08C-59A358BD231B}"/>
+              </a:ext>
+            </a:extLst>
+          </p:cNvPr>
+          <p:cNvSpPr>
+            <a:spLocks noGrp="1"/>
+          </p:cNvSpPr>
+          <p:nvPr>
+            <p:ph type="subTitle" idx="1"/>
+          </p:nvPr>
+        </p:nvSpPr>
+        <p:spPr/>
+        <p:txBody>
+          <a:bodyPr/>
+          <a:lstStyle/>
+          <a:p>
+            <a:r>
+              <a:rPr lang="en-US" altLang="zh-TW" dirty="0" smtClean="0"/>
+              <a:t>Credits to Meng, Shane</a:t>
+            </a:r>
+          </a:p>
+          <a:p>
+            <a:r>
+              <a:rPr lang="en-US" altLang="zh-TW" dirty="0" smtClean="0"/>
+              <a:t>By BT</a:t>
+            </a:r>
+            <a:endParaRPr lang="zh-TW" altLang="en-US" dirty="0"/>
+          </a:p>
+        </p:txBody>
+      </p:sp>
+    </p:spTree>
+    <p:extLst>
+      <p:ext uri="{BB962C8B-B14F-4D97-AF65-F5344CB8AC3E}">
+        <p14:creationId xmlns:p14="http://schemas.microsoft.com/office/powerpoint/2010/main" val="2232824169"/>
+      </p:ext>
+    </p:extLst>
+  </p:cSld>
+  <p:clrMapOvr>
+    <a:masterClrMapping/>
+  </p:clrMapOvr>
+  <p:timing>
+    <p:tnLst>
+      <p:par>
+        <p:cTn id="1" dur="indefinite" restart="never" nodeType="tmRoot"/>
+      </p:par>
+    </p:tnLst>
+  </p:timing>
+</p:sld>
+</file>
+
+<file path=ppt/slides/slide20.xml><?xml version="1.0" encoding="utf-8"?>
 <p:sld xmlns:a="http://schemas.openxmlformats.org/drawingml/2006/main" xmlns:r="http://schemas.openxmlformats.org/officeDocument/2006/relationships" xmlns:p="http://schemas.openxmlformats.org/presentationml/2006/main">
   <p:cSld>
     <p:spTree>
@@ -6715,160 +7725,7 @@
 </p:sld>
 </file>
 
-<file path=ppt/slides/slide2.xml><?xml version="1.0" encoding="utf-8"?>
-<p:sld xmlns:a="http://schemas.openxmlformats.org/drawingml/2006/main" xmlns:r="http://schemas.openxmlformats.org/officeDocument/2006/relationships" xmlns:p="http://schemas.openxmlformats.org/presentationml/2006/main">
-  <p:cSld>
-    <p:spTree>
-      <p:nvGrpSpPr>
-        <p:cNvPr id="1" name=""/>
-        <p:cNvGrpSpPr/>
-        <p:nvPr/>
-      </p:nvGrpSpPr>
-      <p:grpSpPr>
-        <a:xfrm>
-          <a:off x="0" y="0"/>
-          <a:ext cx="0" cy="0"/>
-          <a:chOff x="0" y="0"/>
-          <a:chExt cx="0" cy="0"/>
-        </a:xfrm>
-      </p:grpSpPr>
-      <p:sp>
-        <p:nvSpPr>
-          <p:cNvPr id="2" name="標題 1">
-            <a:extLst>
-              <a:ext uri="{FF2B5EF4-FFF2-40B4-BE49-F238E27FC236}">
-                <a16:creationId xmlns:a16="http://schemas.microsoft.com/office/drawing/2014/main" id="{77683780-5252-4D80-8260-9153780B5AF7}"/>
-              </a:ext>
-            </a:extLst>
-          </p:cNvPr>
-          <p:cNvSpPr>
-            <a:spLocks noGrp="1"/>
-          </p:cNvSpPr>
-          <p:nvPr>
-            <p:ph type="title"/>
-          </p:nvPr>
-        </p:nvSpPr>
-        <p:spPr/>
-        <p:txBody>
-          <a:bodyPr/>
-          <a:lstStyle/>
-          <a:p>
-            <a:r>
-              <a:rPr lang="en-US" altLang="zh-TW" dirty="0"/>
-              <a:t>Virtualization</a:t>
-            </a:r>
-            <a:endParaRPr lang="zh-TW" altLang="en-US" dirty="0"/>
-          </a:p>
-        </p:txBody>
-      </p:sp>
-      <p:sp>
-        <p:nvSpPr>
-          <p:cNvPr id="3" name="內容版面配置區 2">
-            <a:extLst>
-              <a:ext uri="{FF2B5EF4-FFF2-40B4-BE49-F238E27FC236}">
-                <a16:creationId xmlns:a16="http://schemas.microsoft.com/office/drawing/2014/main" id="{C861FE41-C3B7-4E02-930E-4883CA0795BE}"/>
-              </a:ext>
-            </a:extLst>
-          </p:cNvPr>
-          <p:cNvSpPr>
-            <a:spLocks noGrp="1"/>
-          </p:cNvSpPr>
-          <p:nvPr>
-            <p:ph idx="1"/>
-          </p:nvPr>
-        </p:nvSpPr>
-        <p:spPr>
-          <a:xfrm>
-            <a:off x="1097280" y="1845734"/>
-            <a:ext cx="10058400" cy="1450757"/>
-          </a:xfrm>
-        </p:spPr>
-        <p:txBody>
-          <a:bodyPr/>
-          <a:lstStyle/>
-          <a:p>
-            <a:pPr>
-              <a:buFont typeface="Wingdings" panose="05000000000000000000" pitchFamily="2" charset="2"/>
-              <a:buChar char="ü"/>
-            </a:pPr>
-            <a:r>
-              <a:rPr lang="en-US" altLang="zh-TW" dirty="0"/>
-              <a:t>Allows multiple simulated environments or dedicated resources from a single hardware</a:t>
-            </a:r>
-          </a:p>
-          <a:p>
-            <a:pPr>
-              <a:buFont typeface="Wingdings" panose="05000000000000000000" pitchFamily="2" charset="2"/>
-              <a:buChar char="ü"/>
-            </a:pPr>
-            <a:r>
-              <a:rPr lang="en-US" altLang="zh-TW" dirty="0"/>
-              <a:t>Hardware independent( as long as it runs the virtualized environment )</a:t>
-            </a:r>
-          </a:p>
-          <a:p>
-            <a:pPr>
-              <a:buFont typeface="Wingdings" panose="05000000000000000000" pitchFamily="2" charset="2"/>
-              <a:buChar char="ü"/>
-            </a:pPr>
-            <a:r>
-              <a:rPr lang="en-US" altLang="zh-TW" dirty="0"/>
-              <a:t>Higher utilization </a:t>
-            </a:r>
-            <a:endParaRPr lang="zh-TW" altLang="en-US" dirty="0"/>
-          </a:p>
-        </p:txBody>
-      </p:sp>
-      <p:pic>
-        <p:nvPicPr>
-          <p:cNvPr id="4" name="圖片 3">
-            <a:extLst>
-              <a:ext uri="{FF2B5EF4-FFF2-40B4-BE49-F238E27FC236}">
-                <a16:creationId xmlns:a16="http://schemas.microsoft.com/office/drawing/2014/main" id="{138B67D3-27CC-427B-91F7-43FFC550B003}"/>
-              </a:ext>
-            </a:extLst>
-          </p:cNvPr>
-          <p:cNvPicPr>
-            <a:picLocks noChangeAspect="1"/>
-          </p:cNvPicPr>
-          <p:nvPr/>
-        </p:nvPicPr>
-        <p:blipFill rotWithShape="1">
-          <a:blip r:embed="rId3"/>
-          <a:srcRect r="53416"/>
-          <a:stretch/>
-        </p:blipFill>
-        <p:spPr>
-          <a:xfrm>
-            <a:off x="9119890" y="3808114"/>
-            <a:ext cx="2900475" cy="2410567"/>
-          </a:xfrm>
-          <a:prstGeom prst="rect">
-            <a:avLst/>
-          </a:prstGeom>
-        </p:spPr>
-      </p:pic>
-    </p:spTree>
-    <p:extLst>
-      <p:ext uri="{BB962C8B-B14F-4D97-AF65-F5344CB8AC3E}">
-        <p14:creationId xmlns:p14="http://schemas.microsoft.com/office/powerpoint/2010/main" val="2514766030"/>
-      </p:ext>
-    </p:extLst>
-  </p:cSld>
-  <p:clrMapOvr>
-    <a:masterClrMapping/>
-  </p:clrMapOvr>
-  <p:timing>
-    <p:tnLst>
-      <p:par>
-        <p:cTn id="1" dur="indefinite" restart="never" nodeType="tmRoot"/>
-      </p:par>
-    </p:tnLst>
-  </p:timing>
-</p:sld>
-</file>
-
-<file path=ppt/slides/slide20.xml><?xml version="1.0" encoding="utf-8"?>
+<file path=ppt/slides/slide21.xml><?xml version="1.0" encoding="utf-8"?>
 <p:sld xmlns:a="http://schemas.openxmlformats.org/drawingml/2006/main" xmlns:r="http://schemas.openxmlformats.org/officeDocument/2006/relationships" xmlns:p="http://schemas.openxmlformats.org/presentationml/2006/main">
   <p:cSld>
     <p:spTree>
@@ -7852,82 +8709,6 @@
 </p:sld>
 </file>
 
-<file path=ppt/slides/slide21.xml><?xml version="1.0" encoding="utf-8"?>
-<p:sld xmlns:a="http://schemas.openxmlformats.org/drawingml/2006/main" xmlns:r="http://schemas.openxmlformats.org/officeDocument/2006/relationships" xmlns:p="http://schemas.openxmlformats.org/presentationml/2006/main">
-  <p:cSld>
-    <p:spTree>
-      <p:nvGrpSpPr>
-        <p:cNvPr id="1" name=""/>
-        <p:cNvGrpSpPr/>
-        <p:nvPr/>
-      </p:nvGrpSpPr>
-      <p:grpSpPr>
-        <a:xfrm>
-          <a:off x="0" y="0"/>
-          <a:ext cx="0" cy="0"/>
-          <a:chOff x="0" y="0"/>
-          <a:chExt cx="0" cy="0"/>
-        </a:xfrm>
-      </p:grpSpPr>
-      <p:sp>
-        <p:nvSpPr>
-          <p:cNvPr id="2" name="標題 1"/>
-          <p:cNvSpPr>
-            <a:spLocks noGrp="1"/>
-          </p:cNvSpPr>
-          <p:nvPr>
-            <p:ph type="title"/>
-          </p:nvPr>
-        </p:nvSpPr>
-        <p:spPr/>
-        <p:txBody>
-          <a:bodyPr/>
-          <a:lstStyle/>
-          <a:p>
-            <a:r>
-              <a:rPr lang="en-US" altLang="zh-TW" dirty="0"/>
-              <a:t>Appendix : </a:t>
-            </a:r>
-            <a:r>
-              <a:rPr lang="en-US" altLang="zh-TW" dirty="0" err="1" smtClean="0"/>
-              <a:t>Tmux</a:t>
-            </a:r>
-            <a:endParaRPr lang="zh-TW" altLang="en-US" dirty="0"/>
-          </a:p>
-        </p:txBody>
-      </p:sp>
-      <p:sp>
-        <p:nvSpPr>
-          <p:cNvPr id="3" name="內容版面配置區 2"/>
-          <p:cNvSpPr>
-            <a:spLocks noGrp="1"/>
-          </p:cNvSpPr>
-          <p:nvPr>
-            <p:ph idx="1"/>
-          </p:nvPr>
-        </p:nvSpPr>
-        <p:spPr/>
-        <p:txBody>
-          <a:bodyPr/>
-          <a:lstStyle/>
-          <a:p>
-            <a:endParaRPr lang="zh-TW" altLang="en-US"/>
-          </a:p>
-        </p:txBody>
-      </p:sp>
-    </p:spTree>
-    <p:extLst>
-      <p:ext uri="{BB962C8B-B14F-4D97-AF65-F5344CB8AC3E}">
-        <p14:creationId xmlns:p14="http://schemas.microsoft.com/office/powerpoint/2010/main" val="46707215"/>
-      </p:ext>
-    </p:extLst>
-  </p:cSld>
-  <p:clrMapOvr>
-    <a:masterClrMapping/>
-  </p:clrMapOvr>
-</p:sld>
-</file>
-
 <file path=ppt/slides/slide22.xml><?xml version="1.0" encoding="utf-8"?>
 <p:sld xmlns:a="http://schemas.openxmlformats.org/drawingml/2006/main" xmlns:r="http://schemas.openxmlformats.org/officeDocument/2006/relationships" xmlns:p="http://schemas.openxmlformats.org/presentationml/2006/main">
   <p:cSld>
@@ -7965,8 +8746,10 @@
               <a:t>Appendix : </a:t>
             </a:r>
             <a:r>
-              <a:rPr lang="en-US" altLang="zh-TW" dirty="0" err="1" smtClean="0"/>
-              <a:t>Fcron</a:t>
+              <a:rPr lang="en-US" altLang="zh-TW" dirty="0" smtClean="0">
+                <a:hlinkClick r:id="rId2"/>
+              </a:rPr>
+              <a:t>Tmux</a:t>
             </a:r>
             <a:endParaRPr lang="zh-TW" altLang="en-US" dirty="0"/>
           </a:p>
@@ -7982,22 +8765,180 @@
             <p:ph idx="1"/>
           </p:nvPr>
         </p:nvSpPr>
-        <p:spPr/>
+        <p:spPr>
+          <a:xfrm>
+            <a:off x="1097280" y="1845734"/>
+            <a:ext cx="10622866" cy="4023360"/>
+          </a:xfrm>
+        </p:spPr>
         <p:txBody>
           <a:bodyPr/>
           <a:lstStyle/>
           <a:p>
-            <a:pPr marL="0" indent="0">
-              <a:buNone/>
-            </a:pPr>
-            <a:endParaRPr lang="zh-TW" altLang="en-US" dirty="0"/>
+            <a:r>
+              <a:rPr lang="en-US" altLang="zh-TW" dirty="0" smtClean="0"/>
+              <a:t>Commands</a:t>
+            </a:r>
+          </a:p>
+          <a:p>
+            <a:pPr lvl="1"/>
+            <a:r>
+              <a:rPr lang="en-US" altLang="zh-TW" dirty="0" smtClean="0"/>
+              <a:t>Tmux a : attach to </a:t>
+            </a:r>
+            <a:r>
+              <a:rPr lang="en-US" altLang="zh-TW" dirty="0" err="1" smtClean="0"/>
+              <a:t>tmux</a:t>
+            </a:r>
+            <a:r>
+              <a:rPr lang="en-US" altLang="zh-TW" dirty="0" smtClean="0"/>
+              <a:t> session, if exists multiple sessions, use –t $id to connect to corresponding session</a:t>
+            </a:r>
+          </a:p>
+          <a:p>
+            <a:pPr lvl="1"/>
+            <a:r>
+              <a:rPr lang="en-US" altLang="zh-TW" dirty="0" smtClean="0"/>
+              <a:t>Tmux ls : list all running sessions</a:t>
+            </a:r>
+          </a:p>
+          <a:p>
+            <a:pPr lvl="1"/>
+            <a:r>
+              <a:rPr lang="en-US" altLang="zh-TW" dirty="0" smtClean="0"/>
+              <a:t>Inside Tmux</a:t>
+            </a:r>
+          </a:p>
+          <a:p>
+            <a:pPr lvl="2"/>
+            <a:r>
+              <a:rPr lang="en-US" altLang="zh-TW" dirty="0" smtClean="0"/>
+              <a:t>[</a:t>
+            </a:r>
+            <a:r>
+              <a:rPr lang="en-US" altLang="zh-TW" dirty="0" err="1" smtClean="0"/>
+              <a:t>Init</a:t>
+            </a:r>
+            <a:r>
+              <a:rPr lang="en-US" altLang="zh-TW" dirty="0" smtClean="0"/>
+              <a:t> key] + d : detach current session</a:t>
+            </a:r>
+          </a:p>
+          <a:p>
+            <a:pPr lvl="2"/>
+            <a:r>
+              <a:rPr lang="en-US" altLang="zh-TW" dirty="0"/>
+              <a:t>[</a:t>
+            </a:r>
+            <a:r>
+              <a:rPr lang="en-US" altLang="zh-TW" dirty="0" err="1"/>
+              <a:t>Init</a:t>
+            </a:r>
+            <a:r>
+              <a:rPr lang="en-US" altLang="zh-TW" dirty="0"/>
+              <a:t> key] </a:t>
+            </a:r>
+            <a:r>
+              <a:rPr lang="en-US" altLang="zh-TW" dirty="0" smtClean="0"/>
+              <a:t>+ % / </a:t>
+            </a:r>
+            <a:r>
+              <a:rPr lang="en-US" altLang="zh-TW" dirty="0"/>
+              <a:t>[</a:t>
+            </a:r>
+            <a:r>
+              <a:rPr lang="en-US" altLang="zh-TW" dirty="0" err="1"/>
+              <a:t>Init</a:t>
+            </a:r>
+            <a:r>
+              <a:rPr lang="en-US" altLang="zh-TW" dirty="0"/>
+              <a:t> key] + </a:t>
+            </a:r>
+            <a:r>
+              <a:rPr lang="en-US" altLang="zh-TW" dirty="0" smtClean="0"/>
+              <a:t>“ : split screen</a:t>
+            </a:r>
+          </a:p>
+          <a:p>
+            <a:pPr lvl="2"/>
+            <a:r>
+              <a:rPr lang="en-US" altLang="zh-TW" dirty="0"/>
+              <a:t>[</a:t>
+            </a:r>
+            <a:r>
+              <a:rPr lang="en-US" altLang="zh-TW" dirty="0" err="1"/>
+              <a:t>Init</a:t>
+            </a:r>
+            <a:r>
+              <a:rPr lang="en-US" altLang="zh-TW" dirty="0"/>
+              <a:t> key] </a:t>
+            </a:r>
+            <a:r>
+              <a:rPr lang="en-US" altLang="zh-TW" dirty="0" smtClean="0"/>
+              <a:t>+ </a:t>
+            </a:r>
+            <a:r>
+              <a:rPr lang="zh-TW" altLang="en-US" dirty="0" smtClean="0"/>
+              <a:t>↑↓←→ </a:t>
+            </a:r>
+            <a:r>
+              <a:rPr lang="en-US" altLang="zh-TW" dirty="0" smtClean="0"/>
+              <a:t>:</a:t>
+            </a:r>
+            <a:r>
+              <a:rPr lang="zh-TW" altLang="en-US" dirty="0" smtClean="0"/>
+              <a:t> </a:t>
+            </a:r>
+            <a:r>
+              <a:rPr lang="en-US" altLang="zh-TW" dirty="0" smtClean="0"/>
+              <a:t>change between windows</a:t>
+            </a:r>
+          </a:p>
+          <a:p>
+            <a:pPr lvl="2"/>
+            <a:r>
+              <a:rPr lang="en-US" altLang="zh-TW" dirty="0"/>
+              <a:t>[</a:t>
+            </a:r>
+            <a:r>
+              <a:rPr lang="en-US" altLang="zh-TW" dirty="0" err="1"/>
+              <a:t>Init</a:t>
+            </a:r>
+            <a:r>
+              <a:rPr lang="en-US" altLang="zh-TW" dirty="0"/>
+              <a:t> key] </a:t>
+            </a:r>
+            <a:r>
+              <a:rPr lang="en-US" altLang="zh-TW" dirty="0" smtClean="0"/>
+              <a:t>+ &amp; : delete current window</a:t>
+            </a:r>
+          </a:p>
+          <a:p>
+            <a:pPr lvl="2"/>
+            <a:r>
+              <a:rPr lang="en-US" altLang="zh-TW" dirty="0"/>
+              <a:t>[</a:t>
+            </a:r>
+            <a:r>
+              <a:rPr lang="en-US" altLang="zh-TW" dirty="0" err="1"/>
+              <a:t>Init</a:t>
+            </a:r>
+            <a:r>
+              <a:rPr lang="en-US" altLang="zh-TW" dirty="0"/>
+              <a:t> key] </a:t>
+            </a:r>
+            <a:r>
+              <a:rPr lang="en-US" altLang="zh-TW" dirty="0" smtClean="0"/>
+              <a:t>+ x : delete current pane</a:t>
+            </a:r>
+            <a:endParaRPr lang="zh-TW" altLang="en-US" b="1" dirty="0"/>
           </a:p>
         </p:txBody>
       </p:sp>
     </p:spTree>
     <p:extLst>
       <p:ext uri="{BB962C8B-B14F-4D97-AF65-F5344CB8AC3E}">
-        <p14:creationId xmlns:p14="http://schemas.microsoft.com/office/powerpoint/2010/main" val="410372291"/>
+        <p14:creationId xmlns:p14="http://schemas.microsoft.com/office/powerpoint/2010/main" val="46707215"/>
       </p:ext>
     </p:extLst>
   </p:cSld>
@@ -8045,7 +8986,7 @@
             </a:r>
             <a:r>
               <a:rPr lang="en-US" altLang="zh-TW" dirty="0" err="1" smtClean="0"/>
-              <a:t>Systemd</a:t>
+              <a:t>cron</a:t>
             </a:r>
             <a:endParaRPr lang="zh-TW" altLang="en-US" dirty="0"/>
           </a:p>
@@ -8069,14 +9010,110 @@
             <a:pPr marL="0" indent="0">
               <a:buNone/>
             </a:pPr>
-            <a:endParaRPr lang="zh-TW" altLang="en-US" dirty="0"/>
+            <a:r>
+              <a:rPr lang="en-US" altLang="zh-TW" dirty="0" smtClean="0"/>
+              <a:t>A automatically periodically running daemon</a:t>
+            </a:r>
+            <a:r>
+              <a:rPr lang="en-US" altLang="zh-TW" dirty="0" smtClean="0"/>
+              <a:t>, “Run XXX every YYY time, or Run AAA every UUU”</a:t>
+            </a:r>
+          </a:p>
+          <a:p>
+            <a:pPr>
+              <a:buFont typeface="Arial" panose="020B0604020202020204" pitchFamily="34" charset="0"/>
+              <a:buChar char="•"/>
+            </a:pPr>
+            <a:r>
+              <a:rPr lang="en-US" altLang="zh-TW" dirty="0" smtClean="0"/>
+              <a:t>Start </a:t>
+            </a:r>
+            <a:r>
+              <a:rPr lang="en-US" altLang="zh-TW" dirty="0" err="1" smtClean="0"/>
+              <a:t>cron</a:t>
+            </a:r>
+            <a:r>
+              <a:rPr lang="en-US" altLang="zh-TW" dirty="0" smtClean="0"/>
+              <a:t> service</a:t>
+            </a:r>
+          </a:p>
+          <a:p>
+            <a:pPr>
+              <a:buFont typeface="Arial" panose="020B0604020202020204" pitchFamily="34" charset="0"/>
+              <a:buChar char="•"/>
+            </a:pPr>
+            <a:r>
+              <a:rPr lang="en-US" altLang="zh-TW" dirty="0" err="1" smtClean="0"/>
+              <a:t>crontab</a:t>
+            </a:r>
+            <a:r>
+              <a:rPr lang="en-US" altLang="zh-TW" dirty="0" smtClean="0"/>
+              <a:t> [–u user] [-l] [-e]</a:t>
+            </a:r>
+          </a:p>
+          <a:p>
+            <a:pPr lvl="1">
+              <a:buFont typeface="Arial" panose="020B0604020202020204" pitchFamily="34" charset="0"/>
+              <a:buChar char="•"/>
+            </a:pPr>
+            <a:r>
+              <a:rPr lang="en-US" altLang="zh-TW" dirty="0" smtClean="0"/>
+              <a:t>-e for editing, -l for listing</a:t>
+            </a:r>
+          </a:p>
+          <a:p>
+            <a:pPr lvl="1">
+              <a:buFont typeface="Arial" panose="020B0604020202020204" pitchFamily="34" charset="0"/>
+              <a:buChar char="•"/>
+            </a:pPr>
+            <a:r>
+              <a:rPr lang="en-US" altLang="zh-TW" dirty="0" smtClean="0"/>
+              <a:t>Format </a:t>
+            </a:r>
+            <a:r>
+              <a:rPr lang="en-US" altLang="zh-TW" dirty="0"/>
+              <a:t>: </a:t>
+            </a:r>
+            <a:r>
+              <a:rPr lang="en-US" altLang="zh-TW" dirty="0" smtClean="0"/>
+              <a:t>min </a:t>
+            </a:r>
+            <a:r>
+              <a:rPr lang="en-US" altLang="zh-TW" dirty="0" err="1"/>
+              <a:t>hrs</a:t>
+            </a:r>
+            <a:r>
+              <a:rPr lang="en-US" altLang="zh-TW" dirty="0"/>
+              <a:t> day-of-month month day-of-week </a:t>
+            </a:r>
+            <a:r>
+              <a:rPr lang="en-US" altLang="zh-TW" dirty="0" smtClean="0"/>
+              <a:t>command</a:t>
+            </a:r>
+          </a:p>
+          <a:p>
+            <a:pPr lvl="2">
+              <a:buFont typeface="Arial" panose="020B0604020202020204" pitchFamily="34" charset="0"/>
+              <a:buChar char="•"/>
+            </a:pPr>
+            <a:r>
+              <a:rPr lang="en-US" altLang="zh-TW" dirty="0" smtClean="0"/>
+              <a:t>15 10 */5 * * echo “hi”</a:t>
+            </a:r>
+          </a:p>
+          <a:p>
+            <a:pPr lvl="1">
+              <a:buFont typeface="Arial" panose="020B0604020202020204" pitchFamily="34" charset="0"/>
+              <a:buChar char="•"/>
+            </a:pPr>
+            <a:endParaRPr lang="en-US" altLang="zh-TW" dirty="0" smtClean="0"/>
           </a:p>
         </p:txBody>
       </p:sp>
     </p:spTree>
     <p:extLst>
       <p:ext uri="{BB962C8B-B14F-4D97-AF65-F5344CB8AC3E}">
-        <p14:creationId xmlns:p14="http://schemas.microsoft.com/office/powerpoint/2010/main" val="3622766869"/>
+        <p14:creationId xmlns:p14="http://schemas.microsoft.com/office/powerpoint/2010/main" val="410372291"/>
       </p:ext>
     </p:extLst>
   </p:cSld>
@@ -8130,28 +9167,54 @@
           </a:p>
         </p:txBody>
       </p:sp>
-      <p:sp>
-        <p:nvSpPr>
-          <p:cNvPr id="3" name="內容版面配置區 2"/>
-          <p:cNvSpPr>
-            <a:spLocks noGrp="1"/>
-          </p:cNvSpPr>
+      <p:pic>
+        <p:nvPicPr>
+          <p:cNvPr id="5" name="內容版面配置區 3"/>
+          <p:cNvPicPr>
+            <a:picLocks noChangeAspect="1"/>
+          </p:cNvPicPr>
+          <p:nvPr/>
+        </p:nvPicPr>
+        <p:blipFill rotWithShape="1">
+          <a:blip r:embed="rId2"/>
+          <a:srcRect b="42368"/>
+          <a:stretch/>
+        </p:blipFill>
+        <p:spPr>
+          <a:xfrm>
+            <a:off x="167053" y="2224453"/>
+            <a:ext cx="5741377" cy="3180994"/>
+          </a:xfrm>
+          <a:prstGeom prst="rect">
+            <a:avLst/>
+          </a:prstGeom>
+        </p:spPr>
+      </p:pic>
+      <p:pic>
+        <p:nvPicPr>
+          <p:cNvPr id="4" name="內容版面配置區 3"/>
+          <p:cNvPicPr>
+            <a:picLocks noGrp="1" noChangeAspect="1"/>
+          </p:cNvPicPr>
           <p:nvPr>
             <p:ph idx="1"/>
           </p:nvPr>
-        </p:nvSpPr>
-        <p:spPr/>
-        <p:txBody>
-          <a:bodyPr/>
-          <a:lstStyle/>
-          <a:p>
-            <a:pPr marL="0" indent="0">
-              <a:buNone/>
-            </a:pPr>
-            <a:endParaRPr lang="zh-TW" altLang="en-US" dirty="0"/>
-          </a:p>
-        </p:txBody>
-      </p:sp>
+        </p:nvPicPr>
+        <p:blipFill rotWithShape="1">
+          <a:blip r:embed="rId2"/>
+          <a:srcRect t="61202" r="16594"/>
+          <a:stretch/>
+        </p:blipFill>
+        <p:spPr>
+          <a:xfrm>
+            <a:off x="5908430" y="2438953"/>
+            <a:ext cx="6153759" cy="2751993"/>
+          </a:xfrm>
+          <a:prstGeom prst="rect">
+            <a:avLst/>
+          </a:prstGeom>
+        </p:spPr>
+      </p:pic>
     </p:spTree>
     <p:extLst>
       <p:ext uri="{BB962C8B-B14F-4D97-AF65-F5344CB8AC3E}">
@@ -8198,12 +9261,8 @@
           <a:lstStyle/>
           <a:p>
             <a:r>
-              <a:rPr lang="en-US" altLang="zh-TW" dirty="0"/>
-              <a:t>Appendix : </a:t>
-            </a:r>
-            <a:r>
-              <a:rPr lang="en-US" altLang="zh-TW" dirty="0" err="1" smtClean="0"/>
-              <a:t>Rclone</a:t>
+              <a:rPr lang="en-US" altLang="zh-TW" dirty="0" smtClean="0"/>
+              <a:t>Flock</a:t>
             </a:r>
             <a:endParaRPr lang="zh-TW" altLang="en-US" dirty="0"/>
           </a:p>
@@ -8221,17 +9280,78 @@
         </p:nvSpPr>
         <p:spPr/>
         <p:txBody>
-          <a:bodyPr/>
+          <a:bodyPr>
+            <a:normAutofit/>
+          </a:bodyPr>
           <a:lstStyle/>
           <a:p>
-            <a:endParaRPr lang="zh-TW" altLang="en-US"/>
+            <a:r>
+              <a:rPr lang="en-US" altLang="zh-TW" sz="2400" dirty="0" smtClean="0"/>
+              <a:t>System wide locking</a:t>
+            </a:r>
+          </a:p>
+          <a:p>
+            <a:pPr lvl="1"/>
+            <a:r>
+              <a:rPr lang="en-US" altLang="zh-TW" sz="2000" dirty="0" smtClean="0"/>
+              <a:t>You can use for loop with &amp; to launch lots of commands, THAT </a:t>
+            </a:r>
+            <a:r>
+              <a:rPr lang="en-US" altLang="zh-TW" sz="2000" dirty="0" smtClean="0">
+                <a:solidFill>
+                  <a:srgbClr val="FF0000"/>
+                </a:solidFill>
+              </a:rPr>
+              <a:t>RUN AT The Same TIME</a:t>
+            </a:r>
+            <a:r>
+              <a:rPr lang="en-US" altLang="zh-TW" sz="2000" dirty="0" smtClean="0"/>
+              <a:t>!!</a:t>
+            </a:r>
+          </a:p>
+          <a:p>
+            <a:pPr lvl="1"/>
+            <a:r>
+              <a:rPr lang="en-US" altLang="zh-TW" sz="2000" dirty="0" smtClean="0"/>
+              <a:t>If you wants to run a bunch of commands one by one, add flock to the start of the command!</a:t>
+            </a:r>
+          </a:p>
+          <a:p>
+            <a:pPr lvl="2"/>
+            <a:r>
+              <a:rPr lang="en-US" altLang="zh-TW" sz="1600" dirty="0" smtClean="0"/>
+              <a:t>Flock /path/to/flock/</a:t>
+            </a:r>
+            <a:r>
+              <a:rPr lang="en-US" altLang="zh-TW" sz="1600" dirty="0" err="1" smtClean="0"/>
+              <a:t>lockfile</a:t>
+            </a:r>
+            <a:r>
+              <a:rPr lang="en-US" altLang="zh-TW" sz="1600" dirty="0" smtClean="0"/>
+              <a:t> command arguments</a:t>
+            </a:r>
+          </a:p>
+          <a:p>
+            <a:pPr lvl="1"/>
+            <a:r>
+              <a:rPr lang="en-US" altLang="zh-TW" sz="2000" dirty="0" smtClean="0"/>
+              <a:t>If you want anything better</a:t>
+            </a:r>
+          </a:p>
+          <a:p>
+            <a:pPr lvl="2"/>
+            <a:r>
+              <a:rPr lang="en-US" altLang="zh-TW" sz="1600" dirty="0" smtClean="0"/>
+              <a:t>Use GNU-Parallel</a:t>
+            </a:r>
+            <a:endParaRPr lang="zh-TW" altLang="en-US" sz="1600" dirty="0"/>
           </a:p>
         </p:txBody>
       </p:sp>
     </p:spTree>
     <p:extLst>
       <p:ext uri="{BB962C8B-B14F-4D97-AF65-F5344CB8AC3E}">
-        <p14:creationId xmlns:p14="http://schemas.microsoft.com/office/powerpoint/2010/main" val="3227702254"/>
+        <p14:creationId xmlns:p14="http://schemas.microsoft.com/office/powerpoint/2010/main" val="34284078"/>
       </p:ext>
     </p:extLst>
   </p:cSld>
@@ -8297,9 +9417,20 @@
           <a:lstStyle/>
           <a:p>
             <a:r>
-              <a:rPr lang="en-US" altLang="zh-TW" dirty="0"/>
-              <a:t>https://explainshell.com/</a:t>
-            </a:r>
+              <a:rPr lang="en-US" altLang="zh-TW" dirty="0">
+                <a:hlinkClick r:id="rId2"/>
+              </a:rPr>
+              <a:t>https://explainshell.com</a:t>
+            </a:r>
+            <a:r>
+              <a:rPr lang="en-US" altLang="zh-TW" dirty="0" smtClean="0">
+                <a:hlinkClick r:id="rId2"/>
+              </a:rPr>
+              <a:t>/</a:t>
+            </a:r>
+            <a:endParaRPr lang="en-US" altLang="zh-TW" dirty="0" smtClean="0"/>
+          </a:p>
+          <a:p>
             <a:endParaRPr lang="zh-TW" altLang="en-US" dirty="0"/>
           </a:p>
         </p:txBody>
@@ -8339,7 +9470,7 @@
           <p:cNvPr id="2" name="標題 1">
             <a:extLst>
               <a:ext uri="{FF2B5EF4-FFF2-40B4-BE49-F238E27FC236}">
-                <a16:creationId xmlns:a16="http://schemas.microsoft.com/office/drawing/2014/main" id="{950B48B3-4605-44C3-8C5C-8E7A0DCCC58B}"/>
+                <a16:creationId xmlns:a16="http://schemas.microsoft.com/office/drawing/2014/main" id="{77683780-5252-4D80-8260-9153780B5AF7}"/>
               </a:ext>
             </a:extLst>
           </p:cNvPr>
@@ -8357,7 +9488,7 @@
           <a:p>
             <a:r>
               <a:rPr lang="en-US" altLang="zh-TW" dirty="0"/>
-              <a:t>Containers</a:t>
+              <a:t>Virtualization</a:t>
             </a:r>
             <a:endParaRPr lang="zh-TW" altLang="en-US" dirty="0"/>
           </a:p>
@@ -8368,7 +9499,7 @@
           <p:cNvPr id="3" name="內容版面配置區 2">
             <a:extLst>
               <a:ext uri="{FF2B5EF4-FFF2-40B4-BE49-F238E27FC236}">
-                <a16:creationId xmlns:a16="http://schemas.microsoft.com/office/drawing/2014/main" id="{EF9EC626-653A-45D7-834B-3449A4936977}"/>
+                <a16:creationId xmlns:a16="http://schemas.microsoft.com/office/drawing/2014/main" id="{C861FE41-C3B7-4E02-930E-4883CA0795BE}"/>
               </a:ext>
             </a:extLst>
           </p:cNvPr>
@@ -8379,100 +9510,81 @@
             <p:ph idx="1"/>
           </p:nvPr>
         </p:nvSpPr>
-        <p:spPr/>
+        <p:spPr>
+          <a:xfrm>
+            <a:off x="1097280" y="1845734"/>
+            <a:ext cx="10058400" cy="1450757"/>
+          </a:xfrm>
+        </p:spPr>
         <p:txBody>
           <a:bodyPr/>
           <a:lstStyle/>
           <a:p>
+            <a:pPr>
+              <a:buFont typeface="Wingdings" panose="05000000000000000000" pitchFamily="2" charset="2"/>
+              <a:buChar char="ü"/>
+            </a:pPr>
             <a:r>
               <a:rPr lang="en-US" altLang="zh-TW" dirty="0"/>
-              <a:t>Linux containers</a:t>
-            </a:r>
-          </a:p>
-          <a:p>
-            <a:pPr lvl="1"/>
+              <a:t>Allows multiple simulated environments or dedicated resources from a single hardware</a:t>
+            </a:r>
+          </a:p>
+          <a:p>
+            <a:pPr>
+              <a:buFont typeface="Wingdings" panose="05000000000000000000" pitchFamily="2" charset="2"/>
+              <a:buChar char="ü"/>
+            </a:pPr>
             <a:r>
               <a:rPr lang="en-US" altLang="zh-TW" dirty="0"/>
-              <a:t>a OS level virtualization method for running multiple isolated Linux systems on one Linux kernel.</a:t>
-            </a:r>
-          </a:p>
-          <a:p>
-            <a:pPr lvl="1"/>
+              <a:t>Hardware independent( as long as it runs the virtualized environment )</a:t>
+            </a:r>
+          </a:p>
+          <a:p>
+            <a:pPr>
+              <a:buFont typeface="Wingdings" panose="05000000000000000000" pitchFamily="2" charset="2"/>
+              <a:buChar char="ü"/>
+            </a:pPr>
             <a:r>
               <a:rPr lang="en-US" altLang="zh-TW" dirty="0"/>
-              <a:t>Docker</a:t>
-            </a:r>
-          </a:p>
-          <a:p>
-            <a:pPr lvl="2"/>
-            <a:r>
-              <a:rPr lang="en-US" altLang="zh-TW" dirty="0"/>
-              <a:t>Automates the deploy of applications</a:t>
-            </a:r>
-          </a:p>
-          <a:p>
-            <a:pPr lvl="2"/>
-            <a:r>
-              <a:rPr lang="en-US" altLang="zh-TW" dirty="0"/>
-              <a:t>Guarantees that it will always run the same regardless of the environment // same architecture</a:t>
-            </a:r>
-          </a:p>
-          <a:p>
-            <a:pPr marL="566928" lvl="3" indent="0">
-              <a:buNone/>
-            </a:pPr>
-            <a:r>
-              <a:rPr lang="en-US" altLang="zh-TW" dirty="0"/>
-              <a:t>* For what?</a:t>
-            </a:r>
-          </a:p>
-          <a:p>
-            <a:r>
-              <a:rPr lang="en-US" altLang="zh-TW" dirty="0"/>
-              <a:t>Linux kernel provides</a:t>
-            </a:r>
-          </a:p>
-          <a:p>
-            <a:pPr lvl="1"/>
-            <a:r>
-              <a:rPr lang="en-US" altLang="zh-TW" dirty="0"/>
-              <a:t>Cgroup</a:t>
-            </a:r>
-          </a:p>
-          <a:p>
-            <a:pPr lvl="2"/>
-            <a:r>
-              <a:rPr lang="en-US" altLang="zh-TW" dirty="0"/>
-              <a:t>Limitation and prioritization of resources</a:t>
-            </a:r>
-          </a:p>
-          <a:p>
-            <a:pPr lvl="1"/>
-            <a:r>
-              <a:rPr lang="en-US" altLang="zh-TW" dirty="0"/>
-              <a:t>Namespace</a:t>
-            </a:r>
-          </a:p>
-          <a:p>
-            <a:pPr lvl="2"/>
-            <a:r>
-              <a:rPr lang="en-US" altLang="zh-TW" dirty="0"/>
-              <a:t>Allows complete isolation of an applications’ view of the OS</a:t>
-            </a:r>
-          </a:p>
-          <a:p>
-            <a:pPr lvl="3"/>
-            <a:r>
-              <a:rPr lang="en-US" altLang="zh-TW" dirty="0"/>
-              <a:t>Including process tree, networking, mounted file system</a:t>
-            </a:r>
+              <a:t>Higher utilization </a:t>
+            </a:r>
+            <a:endParaRPr lang="zh-TW" altLang="en-US" dirty="0"/>
           </a:p>
         </p:txBody>
       </p:sp>
+      <p:pic>
+        <p:nvPicPr>
+          <p:cNvPr id="4" name="圖片 3">
+            <a:extLst>
+              <a:ext uri="{FF2B5EF4-FFF2-40B4-BE49-F238E27FC236}">
+                <a16:creationId xmlns:a16="http://schemas.microsoft.com/office/drawing/2014/main" id="{138B67D3-27CC-427B-91F7-43FFC550B003}"/>
+              </a:ext>
+            </a:extLst>
+          </p:cNvPr>
+          <p:cNvPicPr>
+            <a:picLocks noChangeAspect="1"/>
+          </p:cNvPicPr>
+          <p:nvPr/>
+        </p:nvPicPr>
+        <p:blipFill rotWithShape="1">
+          <a:blip r:embed="rId3"/>
+          <a:srcRect r="53416"/>
+          <a:stretch/>
+        </p:blipFill>
+        <p:spPr>
+          <a:xfrm>
+            <a:off x="9119890" y="3808114"/>
+            <a:ext cx="2900475" cy="2410567"/>
+          </a:xfrm>
+          <a:prstGeom prst="rect">
+            <a:avLst/>
+          </a:prstGeom>
+        </p:spPr>
+      </p:pic>
     </p:spTree>
     <p:extLst>
       <p:ext uri="{BB962C8B-B14F-4D97-AF65-F5344CB8AC3E}">
-        <p14:creationId xmlns:p14="http://schemas.microsoft.com/office/powerpoint/2010/main" val="635600088"/>
+        <p14:creationId xmlns:p14="http://schemas.microsoft.com/office/powerpoint/2010/main" val="2514766030"/>
       </p:ext>
     </p:extLst>
   </p:cSld>
@@ -8511,7 +9623,7 @@
           <p:cNvPr id="2" name="標題 1">
             <a:extLst>
               <a:ext uri="{FF2B5EF4-FFF2-40B4-BE49-F238E27FC236}">
-                <a16:creationId xmlns:a16="http://schemas.microsoft.com/office/drawing/2014/main" id="{BEC0EB8A-C4FD-48F6-8A00-FE54DCF96425}"/>
+                <a16:creationId xmlns:a16="http://schemas.microsoft.com/office/drawing/2014/main" id="{950B48B3-4605-44C3-8C5C-8E7A0DCCC58B}"/>
               </a:ext>
             </a:extLst>
           </p:cNvPr>
@@ -8529,11 +9641,7 @@
           <a:p>
             <a:r>
               <a:rPr lang="en-US" altLang="zh-TW" dirty="0"/>
-              <a:t>Install docker CE on </a:t>
-            </a:r>
-            <a:r>
-              <a:rPr lang="en-US" altLang="zh-TW" dirty="0" err="1"/>
-              <a:t>linux</a:t>
+              <a:t>Containers</a:t>
             </a:r>
             <a:endParaRPr lang="zh-TW" altLang="en-US" dirty="0"/>
           </a:p>
@@ -8544,7 +9652,7 @@
           <p:cNvPr id="3" name="內容版面配置區 2">
             <a:extLst>
               <a:ext uri="{FF2B5EF4-FFF2-40B4-BE49-F238E27FC236}">
-                <a16:creationId xmlns:a16="http://schemas.microsoft.com/office/drawing/2014/main" id="{E7896E59-056B-4B46-B503-D9D1B128232D}"/>
+                <a16:creationId xmlns:a16="http://schemas.microsoft.com/office/drawing/2014/main" id="{EF9EC626-653A-45D7-834B-3449A4936977}"/>
               </a:ext>
             </a:extLst>
           </p:cNvPr>
@@ -8555,145 +9663,100 @@
             <p:ph idx="1"/>
           </p:nvPr>
         </p:nvSpPr>
-        <p:spPr>
-          <a:xfrm>
-            <a:off x="1097280" y="1845734"/>
-            <a:ext cx="10058400" cy="4335258"/>
-          </a:xfrm>
-        </p:spPr>
+        <p:spPr/>
         <p:txBody>
-          <a:bodyPr>
-            <a:normAutofit/>
-          </a:bodyPr>
+          <a:bodyPr/>
           <a:lstStyle/>
           <a:p>
             <a:r>
-              <a:rPr lang="en-US" altLang="zh-TW" sz="1600" dirty="0" err="1"/>
-              <a:t>sudo</a:t>
-            </a:r>
-            <a:r>
-              <a:rPr lang="en-US" altLang="zh-TW" sz="1600" dirty="0"/>
-              <a:t> apt-get remove docker docker-engine docker.io </a:t>
-            </a:r>
-            <a:r>
-              <a:rPr lang="en-US" altLang="zh-TW" sz="1600" dirty="0" err="1"/>
-              <a:t>containerd</a:t>
-            </a:r>
-            <a:r>
-              <a:rPr lang="en-US" altLang="zh-TW" sz="1600" dirty="0"/>
-              <a:t> </a:t>
-            </a:r>
-            <a:r>
-              <a:rPr lang="en-US" altLang="zh-TW" sz="1600" dirty="0" err="1" smtClean="0"/>
-              <a:t>runc</a:t>
-            </a:r>
-            <a:r>
-              <a:rPr lang="zh-TW" altLang="en-US" sz="1600" dirty="0" smtClean="0"/>
-              <a:t> </a:t>
-            </a:r>
-            <a:r>
-              <a:rPr lang="en-US" altLang="zh-TW" sz="1600" dirty="0" smtClean="0"/>
-              <a:t>#</a:t>
-            </a:r>
-            <a:r>
-              <a:rPr lang="zh-TW" altLang="en-US" sz="1600" dirty="0" smtClean="0"/>
-              <a:t> </a:t>
-            </a:r>
-            <a:r>
-              <a:rPr lang="en-US" altLang="zh-TW" sz="1600" dirty="0" smtClean="0"/>
-              <a:t>remove any existing </a:t>
-            </a:r>
-            <a:r>
-              <a:rPr lang="en-US" altLang="zh-TW" sz="1600" dirty="0" err="1" smtClean="0"/>
-              <a:t>docker</a:t>
-            </a:r>
-            <a:endParaRPr lang="en-US" altLang="zh-TW" sz="1600" dirty="0"/>
-          </a:p>
-          <a:p>
-            <a:r>
-              <a:rPr lang="en-US" altLang="zh-TW" sz="1600" dirty="0" err="1"/>
-              <a:t>sudo</a:t>
-            </a:r>
-            <a:r>
-              <a:rPr lang="en-US" altLang="zh-TW" sz="1600" dirty="0"/>
-              <a:t> apt-get update</a:t>
-            </a:r>
-          </a:p>
-          <a:p>
-            <a:r>
-              <a:rPr lang="en-US" altLang="zh-TW" sz="1600" dirty="0" err="1"/>
-              <a:t>sudo</a:t>
-            </a:r>
-            <a:r>
-              <a:rPr lang="en-US" altLang="zh-TW" sz="1600" dirty="0"/>
-              <a:t> apt-get install apt-transport-https ca-certificates curl </a:t>
-            </a:r>
-            <a:r>
-              <a:rPr lang="en-US" altLang="zh-TW" sz="1600" dirty="0" err="1"/>
-              <a:t>gnupg</a:t>
-            </a:r>
-            <a:r>
-              <a:rPr lang="en-US" altLang="zh-TW" sz="1600" dirty="0"/>
-              <a:t>-agent software-properties-common</a:t>
-            </a:r>
-          </a:p>
-          <a:p>
-            <a:r>
-              <a:rPr lang="en-US" altLang="zh-TW" sz="1600" dirty="0"/>
-              <a:t>curl -</a:t>
-            </a:r>
-            <a:r>
-              <a:rPr lang="en-US" altLang="zh-TW" sz="1600" dirty="0" err="1"/>
-              <a:t>fsSL</a:t>
-            </a:r>
-            <a:r>
-              <a:rPr lang="en-US" altLang="zh-TW" sz="1600" dirty="0"/>
-              <a:t> https://download.docker.com/linux/ubuntu/gpg | </a:t>
-            </a:r>
-            <a:r>
-              <a:rPr lang="en-US" altLang="zh-TW" sz="1600" dirty="0" err="1"/>
-              <a:t>sudo</a:t>
-            </a:r>
-            <a:r>
-              <a:rPr lang="en-US" altLang="zh-TW" sz="1600" dirty="0"/>
-              <a:t> apt-key add -</a:t>
-            </a:r>
-          </a:p>
-          <a:p>
-            <a:r>
-              <a:rPr lang="en-US" altLang="zh-TW" sz="1600" dirty="0" err="1"/>
-              <a:t>sudo</a:t>
-            </a:r>
-            <a:r>
-              <a:rPr lang="en-US" altLang="zh-TW" sz="1600" dirty="0"/>
-              <a:t> add-apt-repository "deb [arch=amd64] https://download.docker.com/linux/ubuntu $(</a:t>
-            </a:r>
-            <a:r>
-              <a:rPr lang="en-US" altLang="zh-TW" sz="1600" dirty="0" err="1"/>
-              <a:t>lsb_release</a:t>
-            </a:r>
-            <a:r>
-              <a:rPr lang="en-US" altLang="zh-TW" sz="1600" dirty="0"/>
-              <a:t> -cs) </a:t>
-            </a:r>
-            <a:r>
-              <a:rPr lang="en-US" altLang="zh-TW" sz="1600" dirty="0" smtClean="0"/>
-              <a:t>stable“</a:t>
-            </a:r>
-          </a:p>
-          <a:p>
-            <a:r>
-              <a:rPr lang="en-US" altLang="zh-TW" sz="1600" dirty="0" smtClean="0"/>
-              <a:t># change arch=amd64 to other according to cpu architecture</a:t>
-            </a:r>
-            <a:endParaRPr lang="zh-TW" altLang="en-US" sz="1600" dirty="0"/>
+              <a:rPr lang="en-US" altLang="zh-TW" dirty="0"/>
+              <a:t>Linux containers</a:t>
+            </a:r>
+          </a:p>
+          <a:p>
+            <a:pPr lvl="1"/>
+            <a:r>
+              <a:rPr lang="en-US" altLang="zh-TW" dirty="0"/>
+              <a:t>a OS level virtualization method for running multiple isolated Linux systems on one Linux kernel.</a:t>
+            </a:r>
+          </a:p>
+          <a:p>
+            <a:pPr lvl="1"/>
+            <a:r>
+              <a:rPr lang="en-US" altLang="zh-TW" dirty="0"/>
+              <a:t>Docker</a:t>
+            </a:r>
+          </a:p>
+          <a:p>
+            <a:pPr lvl="2"/>
+            <a:r>
+              <a:rPr lang="en-US" altLang="zh-TW" dirty="0"/>
+              <a:t>Automates the deploy of applications</a:t>
+            </a:r>
+          </a:p>
+          <a:p>
+            <a:pPr lvl="2"/>
+            <a:r>
+              <a:rPr lang="en-US" altLang="zh-TW" dirty="0"/>
+              <a:t>Guarantees that it will always run the same regardless of the environment // same architecture</a:t>
+            </a:r>
+          </a:p>
+          <a:p>
+            <a:pPr marL="566928" lvl="3" indent="0">
+              <a:buNone/>
+            </a:pPr>
+            <a:r>
+              <a:rPr lang="en-US" altLang="zh-TW" dirty="0"/>
+              <a:t>* For what?</a:t>
+            </a:r>
+          </a:p>
+          <a:p>
+            <a:r>
+              <a:rPr lang="en-US" altLang="zh-TW" dirty="0"/>
+              <a:t>Linux kernel provides</a:t>
+            </a:r>
+          </a:p>
+          <a:p>
+            <a:pPr lvl="1"/>
+            <a:r>
+              <a:rPr lang="en-US" altLang="zh-TW" dirty="0"/>
+              <a:t>Cgroup</a:t>
+            </a:r>
+          </a:p>
+          <a:p>
+            <a:pPr lvl="2"/>
+            <a:r>
+              <a:rPr lang="en-US" altLang="zh-TW" dirty="0"/>
+              <a:t>Limitation and prioritization of resources</a:t>
+            </a:r>
+          </a:p>
+          <a:p>
+            <a:pPr lvl="1"/>
+            <a:r>
+              <a:rPr lang="en-US" altLang="zh-TW" dirty="0"/>
+              <a:t>Namespace</a:t>
+            </a:r>
+          </a:p>
+          <a:p>
+            <a:pPr lvl="2"/>
+            <a:r>
+              <a:rPr lang="en-US" altLang="zh-TW" dirty="0"/>
+              <a:t>Allows complete isolation of an applications’ view of the OS</a:t>
+            </a:r>
+          </a:p>
+          <a:p>
+            <a:pPr lvl="3"/>
+            <a:r>
+              <a:rPr lang="en-US" altLang="zh-TW" dirty="0"/>
+              <a:t>Including process tree, networking, mounted file system</a:t>
+            </a:r>
           </a:p>
         </p:txBody>
       </p:sp>
     </p:spTree>
     <p:extLst>
       <p:ext uri="{BB962C8B-B14F-4D97-AF65-F5344CB8AC3E}">
-        <p14:creationId xmlns:p14="http://schemas.microsoft.com/office/powerpoint/2010/main" val="2863466016"/>
+        <p14:creationId xmlns:p14="http://schemas.microsoft.com/office/powerpoint/2010/main" val="635600088"/>
       </p:ext>
     </p:extLst>
   </p:cSld>
@@ -8732,6 +9795,227 @@
           <p:cNvPr id="2" name="標題 1">
             <a:extLst>
               <a:ext uri="{FF2B5EF4-FFF2-40B4-BE49-F238E27FC236}">
+                <a16:creationId xmlns:a16="http://schemas.microsoft.com/office/drawing/2014/main" id="{BEC0EB8A-C4FD-48F6-8A00-FE54DCF96425}"/>
+              </a:ext>
+            </a:extLst>
+          </p:cNvPr>
+          <p:cNvSpPr>
+            <a:spLocks noGrp="1"/>
+          </p:cNvSpPr>
+          <p:nvPr>
+            <p:ph type="title"/>
+          </p:nvPr>
+        </p:nvSpPr>
+        <p:spPr/>
+        <p:txBody>
+          <a:bodyPr/>
+          <a:lstStyle/>
+          <a:p>
+            <a:r>
+              <a:rPr lang="en-US" altLang="zh-TW" dirty="0"/>
+              <a:t>Install docker CE on </a:t>
+            </a:r>
+            <a:r>
+              <a:rPr lang="en-US" altLang="zh-TW" dirty="0" err="1"/>
+              <a:t>linux</a:t>
+            </a:r>
+            <a:endParaRPr lang="zh-TW" altLang="en-US" dirty="0"/>
+          </a:p>
+        </p:txBody>
+      </p:sp>
+      <p:sp>
+        <p:nvSpPr>
+          <p:cNvPr id="3" name="內容版面配置區 2">
+            <a:extLst>
+              <a:ext uri="{FF2B5EF4-FFF2-40B4-BE49-F238E27FC236}">
+                <a16:creationId xmlns:a16="http://schemas.microsoft.com/office/drawing/2014/main" id="{E7896E59-056B-4B46-B503-D9D1B128232D}"/>
+              </a:ext>
+            </a:extLst>
+          </p:cNvPr>
+          <p:cNvSpPr>
+            <a:spLocks noGrp="1"/>
+          </p:cNvSpPr>
+          <p:nvPr>
+            <p:ph idx="1"/>
+          </p:nvPr>
+        </p:nvSpPr>
+        <p:spPr>
+          <a:xfrm>
+            <a:off x="1097280" y="1845734"/>
+            <a:ext cx="10058400" cy="4335258"/>
+          </a:xfrm>
+        </p:spPr>
+        <p:txBody>
+          <a:bodyPr>
+            <a:normAutofit/>
+          </a:bodyPr>
+          <a:lstStyle/>
+          <a:p>
+            <a:r>
+              <a:rPr lang="en-US" altLang="zh-TW" sz="1600" dirty="0" err="1"/>
+              <a:t>sudo</a:t>
+            </a:r>
+            <a:r>
+              <a:rPr lang="en-US" altLang="zh-TW" sz="1600" dirty="0"/>
+              <a:t> apt-get remove docker docker-engine docker.io </a:t>
+            </a:r>
+            <a:r>
+              <a:rPr lang="en-US" altLang="zh-TW" sz="1600" dirty="0" err="1"/>
+              <a:t>containerd</a:t>
+            </a:r>
+            <a:r>
+              <a:rPr lang="en-US" altLang="zh-TW" sz="1600" dirty="0"/>
+              <a:t> </a:t>
+            </a:r>
+            <a:r>
+              <a:rPr lang="en-US" altLang="zh-TW" sz="1600" dirty="0" err="1" smtClean="0"/>
+              <a:t>runc</a:t>
+            </a:r>
+            <a:r>
+              <a:rPr lang="zh-TW" altLang="en-US" sz="1600" dirty="0" smtClean="0"/>
+              <a:t> </a:t>
+            </a:r>
+            <a:r>
+              <a:rPr lang="en-US" altLang="zh-TW" sz="1600" dirty="0" smtClean="0"/>
+              <a:t>#</a:t>
+            </a:r>
+            <a:r>
+              <a:rPr lang="zh-TW" altLang="en-US" sz="1600" dirty="0" smtClean="0"/>
+              <a:t> </a:t>
+            </a:r>
+            <a:r>
+              <a:rPr lang="en-US" altLang="zh-TW" sz="1600" dirty="0" smtClean="0"/>
+              <a:t>remove any existing </a:t>
+            </a:r>
+            <a:r>
+              <a:rPr lang="en-US" altLang="zh-TW" sz="1600" dirty="0" err="1" smtClean="0"/>
+              <a:t>docker</a:t>
+            </a:r>
+            <a:endParaRPr lang="en-US" altLang="zh-TW" sz="1600" dirty="0"/>
+          </a:p>
+          <a:p>
+            <a:r>
+              <a:rPr lang="en-US" altLang="zh-TW" sz="1600" dirty="0" err="1"/>
+              <a:t>sudo</a:t>
+            </a:r>
+            <a:r>
+              <a:rPr lang="en-US" altLang="zh-TW" sz="1600" dirty="0"/>
+              <a:t> apt-get update</a:t>
+            </a:r>
+          </a:p>
+          <a:p>
+            <a:r>
+              <a:rPr lang="en-US" altLang="zh-TW" sz="1600" dirty="0" err="1"/>
+              <a:t>sudo</a:t>
+            </a:r>
+            <a:r>
+              <a:rPr lang="en-US" altLang="zh-TW" sz="1600" dirty="0"/>
+              <a:t> apt-get install apt-transport-https ca-certificates curl </a:t>
+            </a:r>
+            <a:r>
+              <a:rPr lang="en-US" altLang="zh-TW" sz="1600" dirty="0" err="1"/>
+              <a:t>gnupg</a:t>
+            </a:r>
+            <a:r>
+              <a:rPr lang="en-US" altLang="zh-TW" sz="1600" dirty="0"/>
+              <a:t>-agent software-properties-common</a:t>
+            </a:r>
+          </a:p>
+          <a:p>
+            <a:r>
+              <a:rPr lang="en-US" altLang="zh-TW" sz="1600" dirty="0"/>
+              <a:t>curl -</a:t>
+            </a:r>
+            <a:r>
+              <a:rPr lang="en-US" altLang="zh-TW" sz="1600" dirty="0" err="1"/>
+              <a:t>fsSL</a:t>
+            </a:r>
+            <a:r>
+              <a:rPr lang="en-US" altLang="zh-TW" sz="1600" dirty="0"/>
+              <a:t> https://download.docker.com/linux/ubuntu/gpg | </a:t>
+            </a:r>
+            <a:r>
+              <a:rPr lang="en-US" altLang="zh-TW" sz="1600" dirty="0" err="1"/>
+              <a:t>sudo</a:t>
+            </a:r>
+            <a:r>
+              <a:rPr lang="en-US" altLang="zh-TW" sz="1600" dirty="0"/>
+              <a:t> apt-key add -</a:t>
+            </a:r>
+          </a:p>
+          <a:p>
+            <a:r>
+              <a:rPr lang="en-US" altLang="zh-TW" sz="1600" dirty="0" err="1"/>
+              <a:t>sudo</a:t>
+            </a:r>
+            <a:r>
+              <a:rPr lang="en-US" altLang="zh-TW" sz="1600" dirty="0"/>
+              <a:t> add-apt-repository "deb [arch=amd64] https://download.docker.com/linux/ubuntu $(</a:t>
+            </a:r>
+            <a:r>
+              <a:rPr lang="en-US" altLang="zh-TW" sz="1600" dirty="0" err="1"/>
+              <a:t>lsb_release</a:t>
+            </a:r>
+            <a:r>
+              <a:rPr lang="en-US" altLang="zh-TW" sz="1600" dirty="0"/>
+              <a:t> -cs) </a:t>
+            </a:r>
+            <a:r>
+              <a:rPr lang="en-US" altLang="zh-TW" sz="1600" dirty="0" smtClean="0"/>
+              <a:t>stable“</a:t>
+            </a:r>
+          </a:p>
+          <a:p>
+            <a:r>
+              <a:rPr lang="en-US" altLang="zh-TW" sz="1600" dirty="0" smtClean="0"/>
+              <a:t># change arch=amd64 to other according to cpu architecture</a:t>
+            </a:r>
+            <a:endParaRPr lang="zh-TW" altLang="en-US" sz="1600" dirty="0"/>
+          </a:p>
+        </p:txBody>
+      </p:sp>
+    </p:spTree>
+    <p:extLst>
+      <p:ext uri="{BB962C8B-B14F-4D97-AF65-F5344CB8AC3E}">
+        <p14:creationId xmlns:p14="http://schemas.microsoft.com/office/powerpoint/2010/main" val="2863466016"/>
+      </p:ext>
+    </p:extLst>
+  </p:cSld>
+  <p:clrMapOvr>
+    <a:masterClrMapping/>
+  </p:clrMapOvr>
+  <p:timing>
+    <p:tnLst>
+      <p:par>
+        <p:cTn id="1" dur="indefinite" restart="never" nodeType="tmRoot"/>
+      </p:par>
+    </p:tnLst>
+  </p:timing>
+</p:sld>
+</file>
+
+<file path=ppt/slides/slide6.xml><?xml version="1.0" encoding="utf-8"?>
+<p:sld xmlns:a="http://schemas.openxmlformats.org/drawingml/2006/main" xmlns:r="http://schemas.openxmlformats.org/officeDocument/2006/relationships" xmlns:p="http://schemas.openxmlformats.org/presentationml/2006/main">
+  <p:cSld>
+    <p:spTree>
+      <p:nvGrpSpPr>
+        <p:cNvPr id="1" name=""/>
+        <p:cNvGrpSpPr/>
+        <p:nvPr/>
+      </p:nvGrpSpPr>
+      <p:grpSpPr>
+        <a:xfrm>
+          <a:off x="0" y="0"/>
+          <a:ext cx="0" cy="0"/>
+          <a:chOff x="0" y="0"/>
+          <a:chExt cx="0" cy="0"/>
+        </a:xfrm>
+      </p:grpSpPr>
+      <p:sp>
+        <p:nvSpPr>
+          <p:cNvPr id="2" name="標題 1">
+            <a:extLst>
+              <a:ext uri="{FF2B5EF4-FFF2-40B4-BE49-F238E27FC236}">
                 <a16:creationId xmlns:a16="http://schemas.microsoft.com/office/drawing/2014/main" id="{83825934-1AB8-4C7A-A5E2-922DB35D8D59}"/>
               </a:ext>
             </a:extLst>
@@ -8870,7 +10154,7 @@
 </p:sld>
 </file>
 
-<file path=ppt/slides/slide6.xml><?xml version="1.0" encoding="utf-8"?>
+<file path=ppt/slides/slide7.xml><?xml version="1.0" encoding="utf-8"?>
 <p:sld xmlns:a="http://schemas.openxmlformats.org/drawingml/2006/main" xmlns:r="http://schemas.openxmlformats.org/officeDocument/2006/relationships" xmlns:p="http://schemas.openxmlformats.org/presentationml/2006/main">
   <p:cSld>
     <p:spTree>
@@ -11074,7 +12358,7 @@
 </p:sld>
 </file>
 
-<file path=ppt/slides/slide7.xml><?xml version="1.0" encoding="utf-8"?>
+<file path=ppt/slides/slide8.xml><?xml version="1.0" encoding="utf-8"?>
 <p:sld xmlns:a="http://schemas.openxmlformats.org/drawingml/2006/main" xmlns:r="http://schemas.openxmlformats.org/officeDocument/2006/relationships" xmlns:p="http://schemas.openxmlformats.org/presentationml/2006/main">
   <p:cSld>
     <p:spTree>
@@ -11278,7 +12562,7 @@
 </p:sld>
 </file>
 
-<file path=ppt/slides/slide8.xml><?xml version="1.0" encoding="utf-8"?>
+<file path=ppt/slides/slide9.xml><?xml version="1.0" encoding="utf-8"?>
 <p:sld xmlns:a="http://schemas.openxmlformats.org/drawingml/2006/main" xmlns:r="http://schemas.openxmlformats.org/officeDocument/2006/relationships" xmlns:p="http://schemas.openxmlformats.org/presentationml/2006/main">
   <p:cSld>
     <p:spTree>
@@ -12122,886 +13406,6 @@
     <p:extLst>
       <p:ext uri="{BB962C8B-B14F-4D97-AF65-F5344CB8AC3E}">
         <p14:creationId xmlns:p14="http://schemas.microsoft.com/office/powerpoint/2010/main" val="2763981842"/>
-      </p:ext>
-    </p:extLst>
-  </p:cSld>
-  <p:clrMapOvr>
-    <a:masterClrMapping/>
-  </p:clrMapOvr>
-  <p:timing>
-    <p:tnLst>
-      <p:par>
-        <p:cTn id="1" dur="indefinite" restart="never" nodeType="tmRoot"/>
-      </p:par>
-    </p:tnLst>
-  </p:timing>
-</p:sld>
-</file>
-
-<file path=ppt/slides/slide9.xml><?xml version="1.0" encoding="utf-8"?>
-<p:sld xmlns:a="http://schemas.openxmlformats.org/drawingml/2006/main" xmlns:r="http://schemas.openxmlformats.org/officeDocument/2006/relationships" xmlns:p="http://schemas.openxmlformats.org/presentationml/2006/main">
-  <p:cSld>
-    <p:spTree>
-      <p:nvGrpSpPr>
-        <p:cNvPr id="1" name=""/>
-        <p:cNvGrpSpPr/>
-        <p:nvPr/>
-      </p:nvGrpSpPr>
-      <p:grpSpPr>
-        <a:xfrm>
-          <a:off x="0" y="0"/>
-          <a:ext cx="0" cy="0"/>
-          <a:chOff x="0" y="0"/>
-          <a:chExt cx="0" cy="0"/>
-        </a:xfrm>
-      </p:grpSpPr>
-      <p:sp>
-        <p:nvSpPr>
-          <p:cNvPr id="2" name="標題 1">
-            <a:extLst>
-              <a:ext uri="{FF2B5EF4-FFF2-40B4-BE49-F238E27FC236}">
-                <a16:creationId xmlns:a16="http://schemas.microsoft.com/office/drawing/2014/main" id="{B0777A18-CB58-4BE1-89AA-14684198CE0F}"/>
-              </a:ext>
-            </a:extLst>
-          </p:cNvPr>
-          <p:cNvSpPr>
-            <a:spLocks noGrp="1"/>
-          </p:cNvSpPr>
-          <p:nvPr>
-            <p:ph type="title"/>
-          </p:nvPr>
-        </p:nvSpPr>
-        <p:spPr/>
-        <p:txBody>
-          <a:bodyPr/>
-          <a:lstStyle/>
-          <a:p>
-            <a:r>
-              <a:rPr lang="en-US" altLang="zh-TW" dirty="0" err="1"/>
-              <a:t>DockerFile</a:t>
-            </a:r>
-            <a:r>
-              <a:rPr lang="en-US" altLang="zh-TW" dirty="0"/>
-              <a:t/>
-            </a:r>
-            <a:br>
-              <a:rPr lang="en-US" altLang="zh-TW" dirty="0"/>
-            </a:br>
-            <a:r>
-              <a:rPr lang="en-US" altLang="zh-TW" sz="2800" dirty="0"/>
-              <a:t>Build your own image for scratch</a:t>
-            </a:r>
-            <a:endParaRPr lang="zh-TW" altLang="en-US" dirty="0"/>
-          </a:p>
-        </p:txBody>
-      </p:sp>
-      <p:sp>
-        <p:nvSpPr>
-          <p:cNvPr id="3" name="內容版面配置區 2">
-            <a:extLst>
-              <a:ext uri="{FF2B5EF4-FFF2-40B4-BE49-F238E27FC236}">
-                <a16:creationId xmlns:a16="http://schemas.microsoft.com/office/drawing/2014/main" id="{25953EA7-626B-41E1-A872-F71A6CF4AAC2}"/>
-              </a:ext>
-            </a:extLst>
-          </p:cNvPr>
-          <p:cNvSpPr>
-            <a:spLocks noGrp="1"/>
-          </p:cNvSpPr>
-          <p:nvPr>
-            <p:ph idx="1"/>
-          </p:nvPr>
-        </p:nvSpPr>
-        <p:spPr>
-          <a:xfrm>
-            <a:off x="6096000" y="1916756"/>
-            <a:ext cx="5365664" cy="4430778"/>
-          </a:xfrm>
-        </p:spPr>
-        <p:txBody>
-          <a:bodyPr>
-            <a:normAutofit lnSpcReduction="10000"/>
-          </a:bodyPr>
-          <a:lstStyle/>
-          <a:p>
-            <a:r>
-              <a:rPr lang="en-US" altLang="zh-TW" dirty="0"/>
-              <a:t>INSTRUCTION</a:t>
-            </a:r>
-          </a:p>
-          <a:p>
-            <a:pPr lvl="1"/>
-            <a:r>
-              <a:rPr lang="en-US" altLang="zh-TW" dirty="0">
-                <a:hlinkClick r:id="rId2"/>
-              </a:rPr>
-              <a:t>COPY</a:t>
-            </a:r>
-            <a:r>
-              <a:rPr lang="en-US" altLang="zh-TW" dirty="0"/>
-              <a:t> : ( almost same as ADD ) but copy is preferred</a:t>
-            </a:r>
-            <a:r>
-              <a:rPr lang="en-US" altLang="zh-TW" baseline="30000" dirty="0"/>
-              <a:t>1</a:t>
-            </a:r>
-          </a:p>
-          <a:p>
-            <a:pPr lvl="2"/>
-            <a:r>
-              <a:rPr lang="en-US" altLang="zh-TW" sz="1600" dirty="0"/>
-              <a:t>COPY [--</a:t>
-            </a:r>
-            <a:r>
-              <a:rPr lang="en-US" altLang="zh-TW" sz="1600" dirty="0" err="1"/>
-              <a:t>chown</a:t>
-            </a:r>
-            <a:r>
-              <a:rPr lang="en-US" altLang="zh-TW" sz="1600" dirty="0"/>
-              <a:t>=&lt;user&gt;:&lt;group&gt;] &lt;</a:t>
-            </a:r>
-            <a:r>
-              <a:rPr lang="en-US" altLang="zh-TW" sz="1600" dirty="0" err="1"/>
-              <a:t>src</a:t>
-            </a:r>
-            <a:r>
-              <a:rPr lang="en-US" altLang="zh-TW" sz="1600" dirty="0"/>
-              <a:t>&gt;... &lt;</a:t>
-            </a:r>
-            <a:r>
-              <a:rPr lang="en-US" altLang="zh-TW" sz="1600" dirty="0" err="1"/>
-              <a:t>dest</a:t>
-            </a:r>
-            <a:r>
-              <a:rPr lang="en-US" altLang="zh-TW" sz="1600" dirty="0"/>
-              <a:t>&gt;</a:t>
-            </a:r>
-          </a:p>
-          <a:p>
-            <a:pPr lvl="2"/>
-            <a:r>
-              <a:rPr lang="en-US" altLang="zh-TW" dirty="0"/>
-              <a:t>*The directory itself is not copied, just its contents.</a:t>
-            </a:r>
-          </a:p>
-          <a:p>
-            <a:pPr lvl="1"/>
-            <a:r>
-              <a:rPr lang="en-US" altLang="zh-TW" dirty="0">
-                <a:hlinkClick r:id="rId3"/>
-              </a:rPr>
-              <a:t>EXPOSE</a:t>
-            </a:r>
-            <a:r>
-              <a:rPr lang="en-US" altLang="zh-TW" dirty="0"/>
-              <a:t> : specifies the port to listen on</a:t>
-            </a:r>
-          </a:p>
-          <a:p>
-            <a:pPr lvl="2"/>
-            <a:r>
-              <a:rPr lang="en-US" altLang="zh-TW" dirty="0"/>
-              <a:t>EXPOSE 80/</a:t>
-            </a:r>
-            <a:r>
-              <a:rPr lang="en-US" altLang="zh-TW" dirty="0" err="1"/>
-              <a:t>tcp</a:t>
-            </a:r>
-            <a:endParaRPr lang="en-US" altLang="zh-TW" dirty="0"/>
-          </a:p>
-          <a:p>
-            <a:pPr lvl="2"/>
-            <a:r>
-              <a:rPr lang="en-US" altLang="zh-TW" dirty="0"/>
-              <a:t>EXPOSE 80/</a:t>
-            </a:r>
-            <a:r>
-              <a:rPr lang="en-US" altLang="zh-TW" dirty="0" err="1"/>
-              <a:t>udp</a:t>
-            </a:r>
-            <a:endParaRPr lang="en-US" altLang="zh-TW" dirty="0"/>
-          </a:p>
-          <a:p>
-            <a:pPr lvl="1"/>
-            <a:r>
-              <a:rPr lang="en-US" altLang="zh-TW" dirty="0">
-                <a:hlinkClick r:id="rId4"/>
-              </a:rPr>
-              <a:t>CMD</a:t>
-            </a:r>
-            <a:r>
-              <a:rPr lang="en-US" altLang="zh-TW" dirty="0"/>
-              <a:t> : provide defaults for an executing container</a:t>
-            </a:r>
-          </a:p>
-          <a:p>
-            <a:pPr lvl="2"/>
-            <a:r>
-              <a:rPr lang="en-US" altLang="zh-TW" dirty="0"/>
-              <a:t>CMD ["executable","param1","param2"]</a:t>
-            </a:r>
-          </a:p>
-          <a:p>
-            <a:pPr lvl="1"/>
-            <a:r>
-              <a:rPr lang="en-US" altLang="zh-TW" dirty="0">
-                <a:hlinkClick r:id="rId5"/>
-              </a:rPr>
-              <a:t>ENTRYPOINT</a:t>
-            </a:r>
-            <a:r>
-              <a:rPr lang="en-US" altLang="zh-TW" dirty="0"/>
-              <a:t> : let a container run as an executable</a:t>
-            </a:r>
-          </a:p>
-          <a:p>
-            <a:pPr lvl="2"/>
-            <a:r>
-              <a:rPr lang="en-US" altLang="zh-TW" dirty="0"/>
-              <a:t>ENTRYPOINT ["executable", "param1", "param2"]</a:t>
-            </a:r>
-          </a:p>
-          <a:p>
-            <a:pPr lvl="2"/>
-            <a:r>
-              <a:rPr lang="en-US" altLang="zh-TW" dirty="0" err="1">
-                <a:hlinkClick r:id="rId6"/>
-              </a:rPr>
-              <a:t>cmd</a:t>
-            </a:r>
-            <a:r>
-              <a:rPr lang="en-US" altLang="zh-TW" dirty="0">
-                <a:hlinkClick r:id="rId6"/>
-              </a:rPr>
-              <a:t> &amp; </a:t>
-            </a:r>
-            <a:r>
-              <a:rPr lang="en-US" altLang="zh-TW" dirty="0" err="1">
-                <a:hlinkClick r:id="rId6"/>
-              </a:rPr>
-              <a:t>entrypoint</a:t>
-            </a:r>
-            <a:endParaRPr lang="en-US" altLang="zh-TW" dirty="0"/>
-          </a:p>
-          <a:p>
-            <a:pPr lvl="1"/>
-            <a:r>
-              <a:rPr lang="en-US" altLang="zh-TW" dirty="0">
-                <a:hlinkClick r:id="rId7"/>
-              </a:rPr>
-              <a:t>ENV</a:t>
-            </a:r>
-            <a:r>
-              <a:rPr lang="en-US" altLang="zh-TW" dirty="0"/>
-              <a:t> : environment </a:t>
-            </a:r>
-            <a:r>
-              <a:rPr lang="en-US" altLang="zh-TW" dirty="0" err="1"/>
-              <a:t>varables</a:t>
-            </a:r>
-            <a:endParaRPr lang="en-US" altLang="zh-TW" dirty="0"/>
-          </a:p>
-          <a:p>
-            <a:pPr lvl="1"/>
-            <a:r>
-              <a:rPr lang="en-US" altLang="zh-TW" dirty="0">
-                <a:hlinkClick r:id="rId8"/>
-              </a:rPr>
-              <a:t>VOLUME</a:t>
-            </a:r>
-            <a:r>
-              <a:rPr lang="en-US" altLang="zh-TW" dirty="0"/>
-              <a:t> :</a:t>
-            </a:r>
-            <a:r>
-              <a:rPr lang="zh-TW" altLang="en-US" dirty="0"/>
-              <a:t> </a:t>
-            </a:r>
-            <a:endParaRPr lang="en-US" altLang="zh-TW" dirty="0"/>
-          </a:p>
-          <a:p>
-            <a:pPr lvl="2"/>
-            <a:r>
-              <a:rPr lang="en-US" altLang="zh-TW" sz="1600" dirty="0"/>
-              <a:t>VOLUME ["/data"]</a:t>
-            </a:r>
-            <a:endParaRPr lang="en-US" altLang="zh-TW" dirty="0"/>
-          </a:p>
-          <a:p>
-            <a:endParaRPr lang="zh-TW" altLang="en-US" dirty="0"/>
-          </a:p>
-        </p:txBody>
-      </p:sp>
-      <p:sp>
-        <p:nvSpPr>
-          <p:cNvPr id="4" name="矩形 3">
-            <a:extLst>
-              <a:ext uri="{FF2B5EF4-FFF2-40B4-BE49-F238E27FC236}">
-                <a16:creationId xmlns:a16="http://schemas.microsoft.com/office/drawing/2014/main" id="{A833EEEB-EBF5-423E-B91D-517CAB8569D4}"/>
-              </a:ext>
-            </a:extLst>
-          </p:cNvPr>
-          <p:cNvSpPr/>
-          <p:nvPr/>
-        </p:nvSpPr>
-        <p:spPr>
-          <a:xfrm>
-            <a:off x="1097280" y="1922970"/>
-            <a:ext cx="6096000" cy="4725396"/>
-          </a:xfrm>
-          <a:prstGeom prst="rect">
-            <a:avLst/>
-          </a:prstGeom>
-        </p:spPr>
-        <p:txBody>
-          <a:bodyPr vert="horz" lIns="0" tIns="45720" rIns="0" bIns="45720" rtlCol="0">
-            <a:normAutofit/>
-          </a:bodyPr>
-          <a:lstStyle/>
-          <a:p>
-            <a:pPr marL="91440" indent="-91440" defTabSz="914400">
-              <a:lnSpc>
-                <a:spcPct val="90000"/>
-              </a:lnSpc>
-              <a:spcBef>
-                <a:spcPts val="1200"/>
-              </a:spcBef>
-              <a:spcAft>
-                <a:spcPts val="200"/>
-              </a:spcAft>
-              <a:buClr>
-                <a:schemeClr val="accent1"/>
-              </a:buClr>
-              <a:buSzPct val="100000"/>
-              <a:buFont typeface="Calibri" panose="020F0502020204030204" pitchFamily="34" charset="0"/>
-              <a:buChar char=" "/>
-            </a:pPr>
-            <a:r>
-              <a:rPr lang="en-US" altLang="zh-TW" sz="2000" dirty="0">
-                <a:solidFill>
-                  <a:schemeClr val="tx1">
-                    <a:lumMod val="75000"/>
-                    <a:lumOff val="25000"/>
-                  </a:schemeClr>
-                </a:solidFill>
-              </a:rPr>
-              <a:t>INSTRUCTION</a:t>
-            </a:r>
-          </a:p>
-          <a:p>
-            <a:pPr marL="384048" lvl="1" indent="-182880" defTabSz="914400">
-              <a:lnSpc>
-                <a:spcPct val="90000"/>
-              </a:lnSpc>
-              <a:spcBef>
-                <a:spcPts val="200"/>
-              </a:spcBef>
-              <a:spcAft>
-                <a:spcPts val="400"/>
-              </a:spcAft>
-              <a:buClr>
-                <a:schemeClr val="accent1"/>
-              </a:buClr>
-              <a:buFont typeface="Calibri" pitchFamily="34" charset="0"/>
-              <a:buChar char="◦"/>
-            </a:pPr>
-            <a:r>
-              <a:rPr lang="en-US" altLang="zh-TW" dirty="0">
-                <a:solidFill>
-                  <a:schemeClr val="tx1">
-                    <a:lumMod val="75000"/>
-                    <a:lumOff val="25000"/>
-                  </a:schemeClr>
-                </a:solidFill>
-                <a:hlinkClick r:id="rId9"/>
-              </a:rPr>
-              <a:t>FROM</a:t>
-            </a:r>
-            <a:r>
-              <a:rPr lang="en-US" altLang="zh-TW" dirty="0">
-                <a:solidFill>
-                  <a:schemeClr val="tx1">
-                    <a:lumMod val="75000"/>
-                    <a:lumOff val="25000"/>
-                  </a:schemeClr>
-                </a:solidFill>
-              </a:rPr>
-              <a:t> :The base of the image</a:t>
-            </a:r>
-          </a:p>
-          <a:p>
-            <a:pPr marL="566928" lvl="2" indent="-182880" defTabSz="914400">
-              <a:lnSpc>
-                <a:spcPct val="90000"/>
-              </a:lnSpc>
-              <a:spcBef>
-                <a:spcPts val="200"/>
-              </a:spcBef>
-              <a:spcAft>
-                <a:spcPts val="400"/>
-              </a:spcAft>
-              <a:buClr>
-                <a:schemeClr val="accent1"/>
-              </a:buClr>
-              <a:buFont typeface="Calibri" pitchFamily="34" charset="0"/>
-              <a:buChar char="◦"/>
-            </a:pPr>
-            <a:r>
-              <a:rPr lang="en-US" altLang="zh-TW" sz="1600" dirty="0">
-                <a:solidFill>
-                  <a:schemeClr val="tx1">
-                    <a:lumMod val="75000"/>
-                    <a:lumOff val="25000"/>
-                  </a:schemeClr>
-                </a:solidFill>
-              </a:rPr>
-              <a:t>FROM &lt;image&gt;[:&lt;tag&gt;] [AS &lt;name&gt;]</a:t>
-            </a:r>
-          </a:p>
-          <a:p>
-            <a:pPr marL="384048" lvl="1" indent="-182880" defTabSz="914400">
-              <a:lnSpc>
-                <a:spcPct val="90000"/>
-              </a:lnSpc>
-              <a:spcBef>
-                <a:spcPts val="200"/>
-              </a:spcBef>
-              <a:spcAft>
-                <a:spcPts val="400"/>
-              </a:spcAft>
-              <a:buClr>
-                <a:schemeClr val="accent1"/>
-              </a:buClr>
-              <a:buFont typeface="Calibri" pitchFamily="34" charset="0"/>
-              <a:buChar char="◦"/>
-            </a:pPr>
-            <a:r>
-              <a:rPr lang="en-US" altLang="zh-TW" dirty="0">
-                <a:solidFill>
-                  <a:schemeClr val="tx1">
-                    <a:lumMod val="75000"/>
-                    <a:lumOff val="25000"/>
-                  </a:schemeClr>
-                </a:solidFill>
-                <a:hlinkClick r:id="rId10"/>
-              </a:rPr>
-              <a:t>WORKDIR</a:t>
-            </a:r>
-            <a:r>
-              <a:rPr lang="zh-TW" altLang="en-US" dirty="0">
-                <a:solidFill>
-                  <a:schemeClr val="tx1">
-                    <a:lumMod val="75000"/>
-                    <a:lumOff val="25000"/>
-                  </a:schemeClr>
-                </a:solidFill>
-              </a:rPr>
-              <a:t> </a:t>
-            </a:r>
-            <a:r>
-              <a:rPr lang="en-US" altLang="zh-TW" dirty="0">
-                <a:solidFill>
-                  <a:schemeClr val="tx1">
-                    <a:lumMod val="75000"/>
-                    <a:lumOff val="25000"/>
-                  </a:schemeClr>
-                </a:solidFill>
-              </a:rPr>
-              <a:t>:</a:t>
-            </a:r>
-            <a:r>
-              <a:rPr lang="zh-TW" altLang="en-US" dirty="0">
-                <a:solidFill>
-                  <a:schemeClr val="tx1">
-                    <a:lumMod val="75000"/>
-                    <a:lumOff val="25000"/>
-                  </a:schemeClr>
-                </a:solidFill>
-              </a:rPr>
-              <a:t> </a:t>
-            </a:r>
-            <a:endParaRPr lang="en-US" altLang="zh-TW" dirty="0">
-              <a:solidFill>
-                <a:schemeClr val="tx1">
-                  <a:lumMod val="75000"/>
-                  <a:lumOff val="25000"/>
-                </a:schemeClr>
-              </a:solidFill>
-            </a:endParaRPr>
-          </a:p>
-          <a:p>
-            <a:pPr marL="566928" lvl="2" indent="-182880" defTabSz="914400">
-              <a:lnSpc>
-                <a:spcPct val="90000"/>
-              </a:lnSpc>
-              <a:spcBef>
-                <a:spcPts val="200"/>
-              </a:spcBef>
-              <a:spcAft>
-                <a:spcPts val="400"/>
-              </a:spcAft>
-              <a:buClr>
-                <a:schemeClr val="accent1"/>
-              </a:buClr>
-              <a:buFont typeface="Calibri" pitchFamily="34" charset="0"/>
-              <a:buChar char="◦"/>
-            </a:pPr>
-            <a:r>
-              <a:rPr lang="en-US" altLang="zh-TW" sz="1600" dirty="0">
-                <a:solidFill>
-                  <a:schemeClr val="tx1">
-                    <a:lumMod val="75000"/>
-                    <a:lumOff val="25000"/>
-                  </a:schemeClr>
-                </a:solidFill>
-              </a:rPr>
-              <a:t>WORKDIR /path/to/</a:t>
-            </a:r>
-            <a:r>
-              <a:rPr lang="en-US" altLang="zh-TW" sz="1600" dirty="0" err="1">
-                <a:solidFill>
-                  <a:schemeClr val="tx1">
-                    <a:lumMod val="75000"/>
-                    <a:lumOff val="25000"/>
-                  </a:schemeClr>
-                </a:solidFill>
-              </a:rPr>
-              <a:t>workdir</a:t>
-            </a:r>
-            <a:endParaRPr lang="en-US" altLang="zh-TW" sz="1600" dirty="0">
-              <a:solidFill>
-                <a:schemeClr val="tx1">
-                  <a:lumMod val="75000"/>
-                  <a:lumOff val="25000"/>
-                </a:schemeClr>
-              </a:solidFill>
-            </a:endParaRPr>
-          </a:p>
-          <a:p>
-            <a:pPr marL="384048" lvl="1" indent="-182880" defTabSz="914400">
-              <a:lnSpc>
-                <a:spcPct val="90000"/>
-              </a:lnSpc>
-              <a:spcBef>
-                <a:spcPts val="200"/>
-              </a:spcBef>
-              <a:spcAft>
-                <a:spcPts val="400"/>
-              </a:spcAft>
-              <a:buClr>
-                <a:schemeClr val="accent1"/>
-              </a:buClr>
-              <a:buFont typeface="Calibri" pitchFamily="34" charset="0"/>
-              <a:buChar char="◦"/>
-            </a:pPr>
-            <a:r>
-              <a:rPr lang="en-US" altLang="zh-TW" dirty="0">
-                <a:solidFill>
-                  <a:schemeClr val="tx1">
-                    <a:lumMod val="75000"/>
-                    <a:lumOff val="25000"/>
-                  </a:schemeClr>
-                </a:solidFill>
-                <a:hlinkClick r:id="rId11"/>
-              </a:rPr>
-              <a:t>USER</a:t>
-            </a:r>
-            <a:r>
-              <a:rPr lang="zh-TW" altLang="en-US" dirty="0">
-                <a:solidFill>
-                  <a:schemeClr val="tx1">
-                    <a:lumMod val="75000"/>
-                    <a:lumOff val="25000"/>
-                  </a:schemeClr>
-                </a:solidFill>
-              </a:rPr>
-              <a:t> </a:t>
-            </a:r>
-            <a:r>
-              <a:rPr lang="en-US" altLang="zh-TW" dirty="0">
-                <a:solidFill>
-                  <a:schemeClr val="tx1">
-                    <a:lumMod val="75000"/>
-                    <a:lumOff val="25000"/>
-                  </a:schemeClr>
-                </a:solidFill>
-              </a:rPr>
-              <a:t>:</a:t>
-            </a:r>
-            <a:r>
-              <a:rPr lang="zh-TW" altLang="en-US" dirty="0">
-                <a:solidFill>
-                  <a:schemeClr val="tx1">
-                    <a:lumMod val="75000"/>
-                    <a:lumOff val="25000"/>
-                  </a:schemeClr>
-                </a:solidFill>
-              </a:rPr>
-              <a:t> </a:t>
-            </a:r>
-            <a:endParaRPr lang="en-US" altLang="zh-TW" dirty="0">
-              <a:solidFill>
-                <a:schemeClr val="tx1">
-                  <a:lumMod val="75000"/>
-                  <a:lumOff val="25000"/>
-                </a:schemeClr>
-              </a:solidFill>
-            </a:endParaRPr>
-          </a:p>
-          <a:p>
-            <a:pPr marL="566928" lvl="2" indent="-182880" defTabSz="914400">
-              <a:lnSpc>
-                <a:spcPct val="90000"/>
-              </a:lnSpc>
-              <a:spcBef>
-                <a:spcPts val="200"/>
-              </a:spcBef>
-              <a:spcAft>
-                <a:spcPts val="400"/>
-              </a:spcAft>
-              <a:buClr>
-                <a:schemeClr val="accent1"/>
-              </a:buClr>
-              <a:buFont typeface="Calibri" pitchFamily="34" charset="0"/>
-              <a:buChar char="◦"/>
-            </a:pPr>
-            <a:r>
-              <a:rPr lang="en-US" altLang="zh-TW" sz="1600" dirty="0">
-                <a:solidFill>
-                  <a:schemeClr val="tx1">
-                    <a:lumMod val="75000"/>
-                    <a:lumOff val="25000"/>
-                  </a:schemeClr>
-                </a:solidFill>
-              </a:rPr>
-              <a:t>USER &lt;user&gt;[:&lt;group&gt;]</a:t>
-            </a:r>
-          </a:p>
-          <a:p>
-            <a:pPr marL="566928" lvl="2" indent="-182880" defTabSz="914400">
-              <a:lnSpc>
-                <a:spcPct val="90000"/>
-              </a:lnSpc>
-              <a:spcBef>
-                <a:spcPts val="200"/>
-              </a:spcBef>
-              <a:spcAft>
-                <a:spcPts val="400"/>
-              </a:spcAft>
-              <a:buClr>
-                <a:schemeClr val="accent1"/>
-              </a:buClr>
-              <a:buFont typeface="Calibri" pitchFamily="34" charset="0"/>
-              <a:buChar char="◦"/>
-            </a:pPr>
-            <a:r>
-              <a:rPr lang="en-US" altLang="zh-TW" sz="1600" dirty="0">
-                <a:solidFill>
-                  <a:schemeClr val="tx1">
-                    <a:lumMod val="75000"/>
-                    <a:lumOff val="25000"/>
-                  </a:schemeClr>
-                </a:solidFill>
-              </a:rPr>
-              <a:t>USER &lt;UID&gt;[:&lt;GID&gt;]</a:t>
-            </a:r>
-          </a:p>
-          <a:p>
-            <a:pPr marL="384048" lvl="1" indent="-182880" defTabSz="914400">
-              <a:lnSpc>
-                <a:spcPct val="90000"/>
-              </a:lnSpc>
-              <a:spcBef>
-                <a:spcPts val="200"/>
-              </a:spcBef>
-              <a:spcAft>
-                <a:spcPts val="400"/>
-              </a:spcAft>
-              <a:buClr>
-                <a:schemeClr val="accent1"/>
-              </a:buClr>
-              <a:buFont typeface="Calibri" pitchFamily="34" charset="0"/>
-              <a:buChar char="◦"/>
-            </a:pPr>
-            <a:r>
-              <a:rPr lang="en-US" altLang="zh-TW" dirty="0">
-                <a:solidFill>
-                  <a:schemeClr val="tx1">
-                    <a:lumMod val="75000"/>
-                    <a:lumOff val="25000"/>
-                  </a:schemeClr>
-                </a:solidFill>
-                <a:hlinkClick r:id="rId12"/>
-              </a:rPr>
-              <a:t>LABEL</a:t>
-            </a:r>
-            <a:r>
-              <a:rPr lang="en-US" altLang="zh-TW" dirty="0">
-                <a:solidFill>
-                  <a:schemeClr val="tx1">
-                    <a:lumMod val="75000"/>
-                    <a:lumOff val="25000"/>
-                  </a:schemeClr>
-                </a:solidFill>
-              </a:rPr>
-              <a:t> : metadata for image</a:t>
-            </a:r>
-          </a:p>
-          <a:p>
-            <a:pPr marL="384048" lvl="1" indent="-182880" defTabSz="914400">
-              <a:lnSpc>
-                <a:spcPct val="90000"/>
-              </a:lnSpc>
-              <a:spcBef>
-                <a:spcPts val="200"/>
-              </a:spcBef>
-              <a:spcAft>
-                <a:spcPts val="400"/>
-              </a:spcAft>
-              <a:buClr>
-                <a:schemeClr val="accent1"/>
-              </a:buClr>
-              <a:buFont typeface="Calibri" pitchFamily="34" charset="0"/>
-              <a:buChar char="◦"/>
-            </a:pPr>
-            <a:r>
-              <a:rPr lang="en-US" altLang="zh-TW" dirty="0">
-                <a:solidFill>
-                  <a:schemeClr val="tx1">
-                    <a:lumMod val="75000"/>
-                    <a:lumOff val="25000"/>
-                  </a:schemeClr>
-                </a:solidFill>
-                <a:hlinkClick r:id="rId13"/>
-              </a:rPr>
-              <a:t>RUN</a:t>
-            </a:r>
-            <a:r>
-              <a:rPr lang="en-US" altLang="zh-TW" dirty="0">
-                <a:solidFill>
-                  <a:schemeClr val="tx1">
-                    <a:lumMod val="75000"/>
-                    <a:lumOff val="25000"/>
-                  </a:schemeClr>
-                </a:solidFill>
-              </a:rPr>
-              <a:t> : execute a command</a:t>
-            </a:r>
-          </a:p>
-          <a:p>
-            <a:pPr marL="566928" lvl="2" indent="-182880" defTabSz="914400">
-              <a:lnSpc>
-                <a:spcPct val="90000"/>
-              </a:lnSpc>
-              <a:spcBef>
-                <a:spcPts val="200"/>
-              </a:spcBef>
-              <a:spcAft>
-                <a:spcPts val="400"/>
-              </a:spcAft>
-              <a:buClr>
-                <a:schemeClr val="accent1"/>
-              </a:buClr>
-              <a:buFont typeface="Calibri" pitchFamily="34" charset="0"/>
-              <a:buChar char="◦"/>
-            </a:pPr>
-            <a:r>
-              <a:rPr lang="en-US" altLang="zh-TW" sz="1600" dirty="0">
-                <a:solidFill>
-                  <a:schemeClr val="tx1">
-                    <a:lumMod val="75000"/>
-                    <a:lumOff val="25000"/>
-                  </a:schemeClr>
-                </a:solidFill>
-              </a:rPr>
-              <a:t>RUN &lt;command&gt;</a:t>
-            </a:r>
-          </a:p>
-          <a:p>
-            <a:pPr marL="566928" lvl="2" indent="-182880" defTabSz="914400">
-              <a:lnSpc>
-                <a:spcPct val="90000"/>
-              </a:lnSpc>
-              <a:spcBef>
-                <a:spcPts val="200"/>
-              </a:spcBef>
-              <a:spcAft>
-                <a:spcPts val="400"/>
-              </a:spcAft>
-              <a:buClr>
-                <a:schemeClr val="accent1"/>
-              </a:buClr>
-              <a:buFont typeface="Calibri" pitchFamily="34" charset="0"/>
-              <a:buChar char="◦"/>
-            </a:pPr>
-            <a:r>
-              <a:rPr lang="en-US" altLang="zh-TW" sz="1600" dirty="0">
-                <a:solidFill>
-                  <a:schemeClr val="tx1">
-                    <a:lumMod val="75000"/>
-                    <a:lumOff val="25000"/>
-                  </a:schemeClr>
-                </a:solidFill>
-              </a:rPr>
-              <a:t>RUN ["executable", "param1", "param2"]</a:t>
-            </a:r>
-          </a:p>
-          <a:p>
-            <a:pPr marL="566928" lvl="2" indent="-182880" defTabSz="914400">
-              <a:lnSpc>
-                <a:spcPct val="90000"/>
-              </a:lnSpc>
-              <a:spcBef>
-                <a:spcPts val="200"/>
-              </a:spcBef>
-              <a:spcAft>
-                <a:spcPts val="400"/>
-              </a:spcAft>
-              <a:buClr>
-                <a:schemeClr val="accent1"/>
-              </a:buClr>
-              <a:buFont typeface="Calibri" pitchFamily="34" charset="0"/>
-              <a:buChar char="◦"/>
-            </a:pPr>
-            <a:r>
-              <a:rPr lang="en-US" altLang="zh-TW" sz="1600" dirty="0">
-                <a:solidFill>
-                  <a:schemeClr val="tx1">
-                    <a:lumMod val="75000"/>
-                    <a:lumOff val="25000"/>
-                  </a:schemeClr>
-                </a:solidFill>
-              </a:rPr>
-              <a:t>RUN [ "</a:t>
-            </a:r>
-            <a:r>
-              <a:rPr lang="en-US" altLang="zh-TW" sz="1600" dirty="0" err="1">
-                <a:solidFill>
-                  <a:schemeClr val="tx1">
-                    <a:lumMod val="75000"/>
-                    <a:lumOff val="25000"/>
-                  </a:schemeClr>
-                </a:solidFill>
-              </a:rPr>
-              <a:t>sh</a:t>
-            </a:r>
-            <a:r>
-              <a:rPr lang="en-US" altLang="zh-TW" sz="1600" dirty="0">
-                <a:solidFill>
-                  <a:schemeClr val="tx1">
-                    <a:lumMod val="75000"/>
-                    <a:lumOff val="25000"/>
-                  </a:schemeClr>
-                </a:solidFill>
-              </a:rPr>
-              <a:t>", "-c", "echo $HOME" ]</a:t>
-            </a:r>
-          </a:p>
-        </p:txBody>
-      </p:sp>
-    </p:spTree>
-    <p:extLst>
-      <p:ext uri="{BB962C8B-B14F-4D97-AF65-F5344CB8AC3E}">
-        <p14:creationId xmlns:p14="http://schemas.microsoft.com/office/powerpoint/2010/main" val="3884591709"/>
       </p:ext>
     </p:extLst>
   </p:cSld>

</xml_diff>